<commit_message>
Added missing slide for terraform validate
</commit_message>
<xml_diff>
--- a/Modul_01_IaC_Terraform_Intro/IaC.pptx
+++ b/Modul_01_IaC_Terraform_Intro/IaC.pptx
@@ -5256,11 +5256,7 @@
           <a:p>
             <a:r>
               <a:rPr lang="de-DE" dirty="0" smtClean="0"/>
-              <a:t>Terraform </a:t>
-            </a:r>
-            <a:r>
-              <a:rPr lang="de-DE" dirty="0" smtClean="0"/>
-              <a:t>State</a:t>
+              <a:t>Terraform State</a:t>
             </a:r>
             <a:endParaRPr lang="de-DE" dirty="0"/>
           </a:p>
@@ -7582,7 +7578,6 @@
               <a:rPr lang="de-DE" dirty="0" smtClean="0"/>
               <a:t>Abgleich des State mit den realen Ressourcen</a:t>
             </a:r>
-            <a:endParaRPr lang="de-DE" dirty="0" smtClean="0"/>
           </a:p>
           <a:p>
             <a:r>
@@ -8576,7 +8571,309 @@
           <a:bodyPr/>
           <a:lstStyle/>
           <a:p>
-            <a:endParaRPr lang="de-DE"/>
+            <a:r>
+              <a:rPr lang="de-DE" dirty="0" smtClean="0"/>
+              <a:t>Validierung der aktuellen Terraform Konfiguration</a:t>
+            </a:r>
+          </a:p>
+          <a:p>
+            <a:pPr lvl="1"/>
+            <a:r>
+              <a:rPr lang="de-DE" dirty="0" smtClean="0"/>
+              <a:t>Syntax und Konsistenz</a:t>
+            </a:r>
+            <a:endParaRPr lang="de-DE" dirty="0" smtClean="0"/>
+          </a:p>
+          <a:p>
+            <a:pPr lvl="1"/>
+            <a:r>
+              <a:rPr lang="de-DE" dirty="0" smtClean="0"/>
+              <a:t>Kein Abgleich mit State / Providers</a:t>
+            </a:r>
+            <a:endParaRPr lang="de-DE" dirty="0"/>
+          </a:p>
+        </p:txBody>
+      </p:sp>
+      <p:sp>
+        <p:nvSpPr>
+          <p:cNvPr id="4" name="Rechteck 3"/>
+          <p:cNvSpPr/>
+          <p:nvPr/>
+        </p:nvSpPr>
+        <p:spPr>
+          <a:xfrm>
+            <a:off x="444500" y="3687901"/>
+            <a:ext cx="11353799" cy="2862322"/>
+          </a:xfrm>
+          <a:prstGeom prst="rect">
+            <a:avLst/>
+          </a:prstGeom>
+          <a:solidFill>
+            <a:schemeClr val="tx1"/>
+          </a:solidFill>
+        </p:spPr>
+        <p:txBody>
+          <a:bodyPr wrap="square">
+            <a:spAutoFit/>
+          </a:bodyPr>
+          <a:lstStyle/>
+          <a:p>
+            <a:r>
+              <a:rPr lang="de-DE" sz="2000" dirty="0" smtClean="0">
+                <a:solidFill>
+                  <a:schemeClr val="bg1">
+                    <a:lumMod val="85000"/>
+                  </a:schemeClr>
+                </a:solidFill>
+                <a:latin typeface="Consolas" panose="020B0609020204030204" pitchFamily="49" charset="0"/>
+              </a:rPr>
+              <a:t>C:\example </a:t>
+            </a:r>
+            <a:r>
+              <a:rPr lang="de-DE" sz="2000" dirty="0" smtClean="0">
+                <a:solidFill>
+                  <a:schemeClr val="bg1">
+                    <a:lumMod val="85000"/>
+                  </a:schemeClr>
+                </a:solidFill>
+                <a:latin typeface="Consolas" panose="020B0609020204030204" pitchFamily="49" charset="0"/>
+              </a:rPr>
+              <a:t>&gt;</a:t>
+            </a:r>
+            <a:r>
+              <a:rPr lang="en-US" sz="2000" dirty="0" smtClean="0">
+                <a:solidFill>
+                  <a:schemeClr val="bg1">
+                    <a:lumMod val="85000"/>
+                  </a:schemeClr>
+                </a:solidFill>
+                <a:latin typeface="Consolas" panose="020B0609020204030204" pitchFamily="49" charset="0"/>
+              </a:rPr>
+              <a:t>terraform </a:t>
+            </a:r>
+            <a:r>
+              <a:rPr lang="en-US" sz="2000" dirty="0">
+                <a:solidFill>
+                  <a:schemeClr val="bg1">
+                    <a:lumMod val="85000"/>
+                  </a:schemeClr>
+                </a:solidFill>
+                <a:latin typeface="Consolas" panose="020B0609020204030204" pitchFamily="49" charset="0"/>
+              </a:rPr>
+              <a:t>validate</a:t>
+            </a:r>
+          </a:p>
+          <a:p>
+            <a:endParaRPr lang="en-US" sz="2000" dirty="0" smtClean="0">
+              <a:solidFill>
+                <a:schemeClr val="bg1">
+                  <a:lumMod val="85000"/>
+                </a:schemeClr>
+              </a:solidFill>
+              <a:latin typeface="Consolas" panose="020B0609020204030204" pitchFamily="49" charset="0"/>
+            </a:endParaRPr>
+          </a:p>
+          <a:p>
+            <a:r>
+              <a:rPr lang="en-US" sz="2000" dirty="0" smtClean="0">
+                <a:solidFill>
+                  <a:srgbClr val="FF0000"/>
+                </a:solidFill>
+                <a:latin typeface="Consolas" panose="020B0609020204030204" pitchFamily="49" charset="0"/>
+              </a:rPr>
+              <a:t>Error</a:t>
+            </a:r>
+            <a:r>
+              <a:rPr lang="en-US" sz="2000" dirty="0">
+                <a:solidFill>
+                  <a:schemeClr val="bg1">
+                    <a:lumMod val="85000"/>
+                  </a:schemeClr>
+                </a:solidFill>
+                <a:latin typeface="Consolas" panose="020B0609020204030204" pitchFamily="49" charset="0"/>
+              </a:rPr>
+              <a:t>: Reference to undeclared resource</a:t>
+            </a:r>
+          </a:p>
+          <a:p>
+            <a:endParaRPr lang="en-US" sz="2000" dirty="0">
+              <a:solidFill>
+                <a:schemeClr val="bg1">
+                  <a:lumMod val="85000"/>
+                </a:schemeClr>
+              </a:solidFill>
+              <a:latin typeface="Consolas" panose="020B0609020204030204" pitchFamily="49" charset="0"/>
+            </a:endParaRPr>
+          </a:p>
+          <a:p>
+            <a:r>
+              <a:rPr lang="en-US" sz="2000" dirty="0" smtClean="0">
+                <a:solidFill>
+                  <a:schemeClr val="bg1">
+                    <a:lumMod val="85000"/>
+                  </a:schemeClr>
+                </a:solidFill>
+                <a:latin typeface="Consolas" panose="020B0609020204030204" pitchFamily="49" charset="0"/>
+              </a:rPr>
+              <a:t>  </a:t>
+            </a:r>
+            <a:r>
+              <a:rPr lang="en-US" sz="2000" dirty="0">
+                <a:solidFill>
+                  <a:schemeClr val="bg1">
+                    <a:lumMod val="85000"/>
+                  </a:schemeClr>
+                </a:solidFill>
+                <a:latin typeface="Consolas" panose="020B0609020204030204" pitchFamily="49" charset="0"/>
+              </a:rPr>
+              <a:t>on main.tf line 8, in resource "</a:t>
+            </a:r>
+            <a:r>
+              <a:rPr lang="en-US" sz="2000" dirty="0" err="1">
+                <a:solidFill>
+                  <a:schemeClr val="bg1">
+                    <a:lumMod val="85000"/>
+                  </a:schemeClr>
+                </a:solidFill>
+                <a:latin typeface="Consolas" panose="020B0609020204030204" pitchFamily="49" charset="0"/>
+              </a:rPr>
+              <a:t>aws_instance</a:t>
+            </a:r>
+            <a:r>
+              <a:rPr lang="en-US" sz="2000" dirty="0">
+                <a:solidFill>
+                  <a:schemeClr val="bg1">
+                    <a:lumMod val="85000"/>
+                  </a:schemeClr>
+                </a:solidFill>
+                <a:latin typeface="Consolas" panose="020B0609020204030204" pitchFamily="49" charset="0"/>
+              </a:rPr>
+              <a:t>" "webserver":</a:t>
+            </a:r>
+          </a:p>
+          <a:p>
+            <a:r>
+              <a:rPr lang="en-US" sz="2000" dirty="0" smtClean="0">
+                <a:solidFill>
+                  <a:schemeClr val="bg1">
+                    <a:lumMod val="85000"/>
+                  </a:schemeClr>
+                </a:solidFill>
+                <a:latin typeface="Consolas" panose="020B0609020204030204" pitchFamily="49" charset="0"/>
+              </a:rPr>
+              <a:t>    </a:t>
+            </a:r>
+            <a:r>
+              <a:rPr lang="en-US" sz="2000" dirty="0">
+                <a:solidFill>
+                  <a:schemeClr val="bg1">
+                    <a:lumMod val="85000"/>
+                  </a:schemeClr>
+                </a:solidFill>
+                <a:latin typeface="Consolas" panose="020B0609020204030204" pitchFamily="49" charset="0"/>
+              </a:rPr>
+              <a:t>8:   </a:t>
+            </a:r>
+            <a:r>
+              <a:rPr lang="en-US" sz="2000" dirty="0" err="1">
+                <a:solidFill>
+                  <a:schemeClr val="bg1">
+                    <a:lumMod val="85000"/>
+                  </a:schemeClr>
+                </a:solidFill>
+                <a:latin typeface="Consolas" panose="020B0609020204030204" pitchFamily="49" charset="0"/>
+              </a:rPr>
+              <a:t>security_groups</a:t>
+            </a:r>
+            <a:r>
+              <a:rPr lang="en-US" sz="2000" dirty="0">
+                <a:solidFill>
+                  <a:schemeClr val="bg1">
+                    <a:lumMod val="85000"/>
+                  </a:schemeClr>
+                </a:solidFill>
+                <a:latin typeface="Consolas" panose="020B0609020204030204" pitchFamily="49" charset="0"/>
+              </a:rPr>
+              <a:t> = [aws_security_group.webserve.name]</a:t>
+            </a:r>
+          </a:p>
+          <a:p>
+            <a:endParaRPr lang="en-US" sz="2000" dirty="0">
+              <a:solidFill>
+                <a:schemeClr val="bg1">
+                  <a:lumMod val="85000"/>
+                </a:schemeClr>
+              </a:solidFill>
+              <a:latin typeface="Consolas" panose="020B0609020204030204" pitchFamily="49" charset="0"/>
+            </a:endParaRPr>
+          </a:p>
+          <a:p>
+            <a:r>
+              <a:rPr lang="en-US" sz="2000" dirty="0" smtClean="0">
+                <a:solidFill>
+                  <a:schemeClr val="bg1">
+                    <a:lumMod val="85000"/>
+                  </a:schemeClr>
+                </a:solidFill>
+                <a:latin typeface="Consolas" panose="020B0609020204030204" pitchFamily="49" charset="0"/>
+              </a:rPr>
+              <a:t>A </a:t>
+            </a:r>
+            <a:r>
+              <a:rPr lang="en-US" sz="2000" dirty="0">
+                <a:solidFill>
+                  <a:schemeClr val="bg1">
+                    <a:lumMod val="85000"/>
+                  </a:schemeClr>
+                </a:solidFill>
+                <a:latin typeface="Consolas" panose="020B0609020204030204" pitchFamily="49" charset="0"/>
+              </a:rPr>
+              <a:t>managed resource "</a:t>
+            </a:r>
+            <a:r>
+              <a:rPr lang="en-US" sz="2000" dirty="0" err="1">
+                <a:solidFill>
+                  <a:schemeClr val="bg1">
+                    <a:lumMod val="85000"/>
+                  </a:schemeClr>
+                </a:solidFill>
+                <a:latin typeface="Consolas" panose="020B0609020204030204" pitchFamily="49" charset="0"/>
+              </a:rPr>
+              <a:t>aws_security_group</a:t>
+            </a:r>
+            <a:r>
+              <a:rPr lang="en-US" sz="2000" dirty="0">
+                <a:solidFill>
+                  <a:schemeClr val="bg1">
+                    <a:lumMod val="85000"/>
+                  </a:schemeClr>
+                </a:solidFill>
+                <a:latin typeface="Consolas" panose="020B0609020204030204" pitchFamily="49" charset="0"/>
+              </a:rPr>
+              <a:t>" "</a:t>
+            </a:r>
+            <a:r>
+              <a:rPr lang="en-US" sz="2000" dirty="0" err="1">
+                <a:solidFill>
+                  <a:schemeClr val="bg1">
+                    <a:lumMod val="85000"/>
+                  </a:schemeClr>
+                </a:solidFill>
+                <a:latin typeface="Consolas" panose="020B0609020204030204" pitchFamily="49" charset="0"/>
+              </a:rPr>
+              <a:t>webserve</a:t>
+            </a:r>
+            <a:r>
+              <a:rPr lang="en-US" sz="2000" dirty="0">
+                <a:solidFill>
+                  <a:schemeClr val="bg1">
+                    <a:lumMod val="85000"/>
+                  </a:schemeClr>
+                </a:solidFill>
+                <a:latin typeface="Consolas" panose="020B0609020204030204" pitchFamily="49" charset="0"/>
+              </a:rPr>
+              <a:t>" has not been declared in the root module.</a:t>
+            </a:r>
           </a:p>
         </p:txBody>
       </p:sp>
@@ -9595,7 +9892,6 @@
               <a:rPr lang="de-DE" dirty="0" smtClean="0"/>
               <a:t>Konfiguration unterliegt Versionskontrolle</a:t>
             </a:r>
-            <a:endParaRPr lang="de-DE" dirty="0" smtClean="0"/>
           </a:p>
           <a:p>
             <a:pPr>
@@ -9636,7 +9932,6 @@
               <a:rPr lang="de-DE" dirty="0" smtClean="0"/>
               <a:t>Einfaches wiederverwenden einzelner Module oder ganzer Environments</a:t>
             </a:r>
-            <a:endParaRPr lang="de-DE" dirty="0" smtClean="0"/>
           </a:p>
           <a:p>
             <a:pPr>
@@ -9688,15 +9983,7 @@
             </a:pPr>
             <a:r>
               <a:rPr lang="de-DE" dirty="0" smtClean="0"/>
-              <a:t>Statische </a:t>
-            </a:r>
-            <a:r>
-              <a:rPr lang="de-DE" dirty="0" smtClean="0"/>
-              <a:t>Analyse und </a:t>
-            </a:r>
-            <a:r>
-              <a:rPr lang="de-DE" dirty="0" smtClean="0"/>
-              <a:t>Code Reviews</a:t>
+              <a:t>Statische Analyse und Code Reviews</a:t>
             </a:r>
             <a:endParaRPr lang="de-DE" dirty="0"/>
           </a:p>

</xml_diff>

<commit_message>
added presentation for modul 10 minor update of agenda added example for webserver with lb
</commit_message>
<xml_diff>
--- a/Modul_01_IaC_Terraform_Intro/IaC.pptx
+++ b/Modul_01_IaC_Terraform_Intro/IaC.pptx
@@ -215,7 +215,7 @@
           <a:p>
             <a:fld id="{E9DAB8B5-B9A3-426D-91D9-D7966B0F2B79}" type="datetimeFigureOut">
               <a:rPr lang="de-DE" smtClean="0"/>
-              <a:t>20.11.2021</a:t>
+              <a:t>21.11.2021</a:t>
             </a:fld>
             <a:endParaRPr lang="de-DE"/>
           </a:p>
@@ -2239,7 +2239,7 @@
           <a:p>
             <a:fld id="{6CBA03CC-73C5-46A8-8DFB-B5DC4577D8E2}" type="datetimeFigureOut">
               <a:rPr lang="de-DE" smtClean="0"/>
-              <a:t>20.11.2021</a:t>
+              <a:t>21.11.2021</a:t>
             </a:fld>
             <a:endParaRPr lang="de-DE"/>
           </a:p>
@@ -2409,7 +2409,7 @@
           <a:p>
             <a:fld id="{6CBA03CC-73C5-46A8-8DFB-B5DC4577D8E2}" type="datetimeFigureOut">
               <a:rPr lang="de-DE" smtClean="0"/>
-              <a:t>20.11.2021</a:t>
+              <a:t>21.11.2021</a:t>
             </a:fld>
             <a:endParaRPr lang="de-DE"/>
           </a:p>
@@ -2589,7 +2589,7 @@
           <a:p>
             <a:fld id="{6CBA03CC-73C5-46A8-8DFB-B5DC4577D8E2}" type="datetimeFigureOut">
               <a:rPr lang="de-DE" smtClean="0"/>
-              <a:t>20.11.2021</a:t>
+              <a:t>21.11.2021</a:t>
             </a:fld>
             <a:endParaRPr lang="de-DE"/>
           </a:p>
@@ -2759,7 +2759,7 @@
           <a:p>
             <a:fld id="{6CBA03CC-73C5-46A8-8DFB-B5DC4577D8E2}" type="datetimeFigureOut">
               <a:rPr lang="de-DE" smtClean="0"/>
-              <a:t>20.11.2021</a:t>
+              <a:t>21.11.2021</a:t>
             </a:fld>
             <a:endParaRPr lang="de-DE"/>
           </a:p>
@@ -3005,7 +3005,7 @@
           <a:p>
             <a:fld id="{6CBA03CC-73C5-46A8-8DFB-B5DC4577D8E2}" type="datetimeFigureOut">
               <a:rPr lang="de-DE" smtClean="0"/>
-              <a:t>20.11.2021</a:t>
+              <a:t>21.11.2021</a:t>
             </a:fld>
             <a:endParaRPr lang="de-DE"/>
           </a:p>
@@ -3237,7 +3237,7 @@
           <a:p>
             <a:fld id="{6CBA03CC-73C5-46A8-8DFB-B5DC4577D8E2}" type="datetimeFigureOut">
               <a:rPr lang="de-DE" smtClean="0"/>
-              <a:t>20.11.2021</a:t>
+              <a:t>21.11.2021</a:t>
             </a:fld>
             <a:endParaRPr lang="de-DE"/>
           </a:p>
@@ -3604,7 +3604,7 @@
           <a:p>
             <a:fld id="{6CBA03CC-73C5-46A8-8DFB-B5DC4577D8E2}" type="datetimeFigureOut">
               <a:rPr lang="de-DE" smtClean="0"/>
-              <a:t>20.11.2021</a:t>
+              <a:t>21.11.2021</a:t>
             </a:fld>
             <a:endParaRPr lang="de-DE"/>
           </a:p>
@@ -3722,7 +3722,7 @@
           <a:p>
             <a:fld id="{6CBA03CC-73C5-46A8-8DFB-B5DC4577D8E2}" type="datetimeFigureOut">
               <a:rPr lang="de-DE" smtClean="0"/>
-              <a:t>20.11.2021</a:t>
+              <a:t>21.11.2021</a:t>
             </a:fld>
             <a:endParaRPr lang="de-DE"/>
           </a:p>
@@ -3817,7 +3817,7 @@
           <a:p>
             <a:fld id="{6CBA03CC-73C5-46A8-8DFB-B5DC4577D8E2}" type="datetimeFigureOut">
               <a:rPr lang="de-DE" smtClean="0"/>
-              <a:t>20.11.2021</a:t>
+              <a:t>21.11.2021</a:t>
             </a:fld>
             <a:endParaRPr lang="de-DE"/>
           </a:p>
@@ -4094,7 +4094,7 @@
           <a:p>
             <a:fld id="{6CBA03CC-73C5-46A8-8DFB-B5DC4577D8E2}" type="datetimeFigureOut">
               <a:rPr lang="de-DE" smtClean="0"/>
-              <a:t>20.11.2021</a:t>
+              <a:t>21.11.2021</a:t>
             </a:fld>
             <a:endParaRPr lang="de-DE"/>
           </a:p>
@@ -4347,7 +4347,7 @@
           <a:p>
             <a:fld id="{6CBA03CC-73C5-46A8-8DFB-B5DC4577D8E2}" type="datetimeFigureOut">
               <a:rPr lang="de-DE" smtClean="0"/>
-              <a:t>20.11.2021</a:t>
+              <a:t>21.11.2021</a:t>
             </a:fld>
             <a:endParaRPr lang="de-DE"/>
           </a:p>
@@ -4560,7 +4560,7 @@
           <a:p>
             <a:fld id="{6CBA03CC-73C5-46A8-8DFB-B5DC4577D8E2}" type="datetimeFigureOut">
               <a:rPr lang="de-DE" smtClean="0"/>
-              <a:t>20.11.2021</a:t>
+              <a:t>21.11.2021</a:t>
             </a:fld>
             <a:endParaRPr lang="de-DE"/>
           </a:p>
@@ -8582,7 +8582,6 @@
               <a:rPr lang="de-DE" dirty="0" smtClean="0"/>
               <a:t>Syntax und Konsistenz</a:t>
             </a:r>
-            <a:endParaRPr lang="de-DE" dirty="0" smtClean="0"/>
           </a:p>
           <a:p>
             <a:pPr lvl="1"/>
@@ -8627,18 +8626,7 @@
                 </a:solidFill>
                 <a:latin typeface="Consolas" panose="020B0609020204030204" pitchFamily="49" charset="0"/>
               </a:rPr>
-              <a:t>C:\example </a:t>
-            </a:r>
-            <a:r>
-              <a:rPr lang="de-DE" sz="2000" dirty="0" smtClean="0">
-                <a:solidFill>
-                  <a:schemeClr val="bg1">
-                    <a:lumMod val="85000"/>
-                  </a:schemeClr>
-                </a:solidFill>
-                <a:latin typeface="Consolas" panose="020B0609020204030204" pitchFamily="49" charset="0"/>
-              </a:rPr>
-              <a:t>&gt;</a:t>
+              <a:t>C:\example &gt;</a:t>
             </a:r>
             <a:r>
               <a:rPr lang="en-US" sz="2000" dirty="0" smtClean="0">
@@ -9280,8 +9268,21 @@
             </a:pPr>
             <a:r>
               <a:rPr lang="de-DE" sz="2600" dirty="0"/>
-              <a:t>Tipps &amp; Tricks</a:t>
-            </a:r>
+              <a:t>Tipps &amp; </a:t>
+            </a:r>
+            <a:r>
+              <a:rPr lang="de-DE" sz="2600" dirty="0" err="1" smtClean="0"/>
+              <a:t>Lessons</a:t>
+            </a:r>
+            <a:r>
+              <a:rPr lang="de-DE" sz="2600" dirty="0" smtClean="0"/>
+              <a:t> </a:t>
+            </a:r>
+            <a:r>
+              <a:rPr lang="de-DE" sz="2600" dirty="0" err="1" smtClean="0"/>
+              <a:t>Learned</a:t>
+            </a:r>
+            <a:endParaRPr lang="de-DE" sz="2600" dirty="0"/>
           </a:p>
           <a:p>
             <a:pPr>

</xml_diff>

<commit_message>
fix typos in presentation refactoring autoscaling
</commit_message>
<xml_diff>
--- a/Modul_01_IaC_Terraform_Intro/IaC.pptx
+++ b/Modul_01_IaC_Terraform_Intro/IaC.pptx
@@ -215,7 +215,7 @@
           <a:p>
             <a:fld id="{E9DAB8B5-B9A3-426D-91D9-D7966B0F2B79}" type="datetimeFigureOut">
               <a:rPr lang="de-DE" smtClean="0"/>
-              <a:t>21.11.2021</a:t>
+              <a:t>07.03.2022</a:t>
             </a:fld>
             <a:endParaRPr lang="de-DE"/>
           </a:p>
@@ -279,38 +279,37 @@
           <a:p>
             <a:pPr lvl="0"/>
             <a:r>
-              <a:rPr lang="de-DE" smtClean="0"/>
+              <a:rPr lang="de-DE"/>
               <a:t>Textmasterformat bearbeiten</a:t>
             </a:r>
           </a:p>
           <a:p>
             <a:pPr lvl="1"/>
             <a:r>
-              <a:rPr lang="de-DE" smtClean="0"/>
+              <a:rPr lang="de-DE"/>
               <a:t>Zweite Ebene</a:t>
             </a:r>
           </a:p>
           <a:p>
             <a:pPr lvl="2"/>
             <a:r>
-              <a:rPr lang="de-DE" smtClean="0"/>
+              <a:rPr lang="de-DE"/>
               <a:t>Dritte Ebene</a:t>
             </a:r>
           </a:p>
           <a:p>
             <a:pPr lvl="3"/>
             <a:r>
-              <a:rPr lang="de-DE" smtClean="0"/>
+              <a:rPr lang="de-DE"/>
               <a:t>Vierte Ebene</a:t>
             </a:r>
           </a:p>
           <a:p>
             <a:pPr lvl="4"/>
             <a:r>
-              <a:rPr lang="de-DE" smtClean="0"/>
+              <a:rPr lang="de-DE"/>
               <a:t>Fünfte Ebene</a:t>
             </a:r>
-            <a:endParaRPr lang="de-DE"/>
           </a:p>
         </p:txBody>
       </p:sp>
@@ -780,19 +779,19 @@
           <a:lstStyle/>
           <a:p>
             <a:r>
-              <a:rPr lang="de-DE" dirty="0" smtClean="0"/>
+              <a:rPr lang="de-DE" dirty="0"/>
               <a:t>Mehr dazu</a:t>
             </a:r>
             <a:r>
-              <a:rPr lang="de-DE" baseline="0" dirty="0" smtClean="0"/>
+              <a:rPr lang="de-DE" baseline="0" dirty="0"/>
               <a:t> in Modul 07 – TF </a:t>
             </a:r>
             <a:r>
-              <a:rPr lang="de-DE" baseline="0" dirty="0" err="1" smtClean="0"/>
+              <a:rPr lang="de-DE" baseline="0" dirty="0" err="1"/>
               <a:t>Backends</a:t>
             </a:r>
             <a:r>
-              <a:rPr lang="de-DE" baseline="0" dirty="0" smtClean="0"/>
+              <a:rPr lang="de-DE" baseline="0" dirty="0"/>
               <a:t>, Modul 2 Providers und Modul 8 Modules</a:t>
             </a:r>
           </a:p>
@@ -1551,26 +1550,25 @@
           <a:lstStyle/>
           <a:p>
             <a:r>
-              <a:rPr lang="de-DE" dirty="0" smtClean="0"/>
+              <a:rPr lang="de-DE" dirty="0"/>
               <a:t>Infrastructure </a:t>
             </a:r>
             <a:r>
-              <a:rPr lang="de-DE" dirty="0" err="1" smtClean="0"/>
+              <a:rPr lang="de-DE" dirty="0" err="1"/>
               <a:t>as</a:t>
             </a:r>
             <a:r>
-              <a:rPr lang="de-DE" dirty="0" smtClean="0"/>
+              <a:rPr lang="de-DE" dirty="0"/>
               <a:t> Code ist ein Ansatz zur Automatisierung der Infrastruktur, der auf Praktiken der Softwareentwicklung basiert. Er legt den Schwerpunkt auf konsistente, wiederholbare Routinen für die Bereitstellung und Änderung von Systemen und deren Konfiguration. Änderungen werden an Definitionen vorgenommen und dann durch unbeaufsichtigte Prozesse, die eine gründliche Validierung beinhalten, auf die Systeme </a:t>
             </a:r>
             <a:r>
-              <a:rPr lang="de-DE" dirty="0" err="1" smtClean="0"/>
+              <a:rPr lang="de-DE" dirty="0" err="1"/>
               <a:t>übertragen.Übersetzt</a:t>
             </a:r>
             <a:r>
-              <a:rPr lang="de-DE" dirty="0" smtClean="0"/>
+              <a:rPr lang="de-DE" dirty="0"/>
               <a:t> mit www.DeepL.com/Translator (kostenlose Version)</a:t>
             </a:r>
-            <a:endParaRPr lang="de-DE" dirty="0"/>
           </a:p>
         </p:txBody>
       </p:sp>
@@ -1739,37 +1737,37 @@
           <a:lstStyle/>
           <a:p>
             <a:r>
-              <a:rPr lang="de-DE" dirty="0" smtClean="0"/>
+              <a:rPr lang="de-DE" dirty="0"/>
               <a:t>Oft keine ganz klare Trennung, aber die stärken der jeweiligen Tools liegen entsprechend</a:t>
             </a:r>
             <a:r>
-              <a:rPr lang="de-DE" baseline="0" dirty="0" smtClean="0"/>
+              <a:rPr lang="de-DE" baseline="0" dirty="0"/>
               <a:t> bei </a:t>
             </a:r>
             <a:r>
-              <a:rPr lang="de-DE" baseline="0" dirty="0" err="1" smtClean="0"/>
+              <a:rPr lang="de-DE" baseline="0" dirty="0" err="1"/>
               <a:t>Config</a:t>
             </a:r>
             <a:r>
-              <a:rPr lang="de-DE" baseline="0" dirty="0" smtClean="0"/>
+              <a:rPr lang="de-DE" baseline="0" dirty="0"/>
               <a:t>/</a:t>
             </a:r>
             <a:r>
-              <a:rPr lang="de-DE" baseline="0" dirty="0" err="1" smtClean="0"/>
+              <a:rPr lang="de-DE" baseline="0" dirty="0" err="1"/>
               <a:t>Provisioning</a:t>
             </a:r>
             <a:r>
-              <a:rPr lang="de-DE" dirty="0" smtClean="0"/>
+              <a:rPr lang="de-DE" dirty="0"/>
               <a:t> </a:t>
             </a:r>
           </a:p>
           <a:p>
             <a:r>
-              <a:rPr lang="de-DE" dirty="0" err="1" smtClean="0"/>
+              <a:rPr lang="de-DE" dirty="0" err="1"/>
               <a:t>Provisioning</a:t>
             </a:r>
             <a:r>
-              <a:rPr lang="de-DE" dirty="0" smtClean="0"/>
+              <a:rPr lang="de-DE" dirty="0"/>
               <a:t> Tools erlauben in der Regel auch die Konfiguration</a:t>
             </a:r>
           </a:p>
@@ -1856,37 +1854,45 @@
           <a:lstStyle/>
           <a:p>
             <a:r>
-              <a:rPr lang="de-DE" dirty="0" smtClean="0"/>
-              <a:t>Oft keine ganz klare Trennung, aber die stärken der jeweiligen Tools liegen entsprechend</a:t>
-            </a:r>
-            <a:r>
-              <a:rPr lang="de-DE" baseline="0" dirty="0" smtClean="0"/>
+              <a:rPr lang="de-DE" dirty="0"/>
+              <a:t>Oft keine ganz klare Trennung, aber die </a:t>
+            </a:r>
+            <a:r>
+              <a:rPr lang="de-DE" dirty="0" err="1"/>
+              <a:t>tärken</a:t>
+            </a:r>
+            <a:r>
+              <a:rPr lang="de-DE" dirty="0"/>
+              <a:t> der jeweiligen Tools liegen entsprechend</a:t>
+            </a:r>
+            <a:r>
+              <a:rPr lang="de-DE" baseline="0" dirty="0"/>
               <a:t> bei </a:t>
             </a:r>
             <a:r>
-              <a:rPr lang="de-DE" baseline="0" dirty="0" err="1" smtClean="0"/>
+              <a:rPr lang="de-DE" baseline="0" dirty="0" err="1"/>
               <a:t>Config</a:t>
             </a:r>
             <a:r>
-              <a:rPr lang="de-DE" baseline="0" dirty="0" smtClean="0"/>
+              <a:rPr lang="de-DE" baseline="0" dirty="0"/>
               <a:t>/</a:t>
             </a:r>
             <a:r>
-              <a:rPr lang="de-DE" baseline="0" dirty="0" err="1" smtClean="0"/>
+              <a:rPr lang="de-DE" baseline="0" dirty="0" err="1"/>
               <a:t>Provisioning</a:t>
             </a:r>
             <a:r>
-              <a:rPr lang="de-DE" dirty="0" smtClean="0"/>
+              <a:rPr lang="de-DE" dirty="0"/>
               <a:t> </a:t>
             </a:r>
           </a:p>
           <a:p>
             <a:r>
-              <a:rPr lang="de-DE" dirty="0" err="1" smtClean="0"/>
+              <a:rPr lang="de-DE" dirty="0" err="1"/>
               <a:t>Provisioning</a:t>
             </a:r>
             <a:r>
-              <a:rPr lang="de-DE" dirty="0" smtClean="0"/>
+              <a:rPr lang="de-DE" dirty="0"/>
               <a:t> Tools erlauben in der Regel auch die Konfiguration</a:t>
             </a:r>
           </a:p>
@@ -1973,18 +1979,17 @@
           <a:lstStyle/>
           <a:p>
             <a:r>
-              <a:rPr lang="de-DE" dirty="0" smtClean="0"/>
+              <a:rPr lang="de-DE" dirty="0"/>
               <a:t>Terraform ist ein Open-Source Infrastructure-</a:t>
             </a:r>
             <a:r>
-              <a:rPr lang="de-DE" dirty="0" err="1" smtClean="0"/>
+              <a:rPr lang="de-DE" dirty="0" err="1"/>
               <a:t>as</a:t>
             </a:r>
             <a:r>
-              <a:rPr lang="de-DE" dirty="0" smtClean="0"/>
+              <a:rPr lang="de-DE" dirty="0"/>
               <a:t>-Code Tool, das einen konsistenten CLI-Workflow zur Verwaltung von Hunderten von Cloud-Diensten bietet. Terraform kodiert Cloud-APIs in deklarativen Konfigurationsdateien.</a:t>
             </a:r>
-            <a:endParaRPr lang="de-DE" dirty="0"/>
           </a:p>
         </p:txBody>
       </p:sp>
@@ -2150,10 +2155,9 @@
           </a:lstStyle>
           <a:p>
             <a:r>
-              <a:rPr lang="de-DE" smtClean="0"/>
+              <a:rPr lang="de-DE"/>
               <a:t>Titelmasterformat durch Klicken bearbeiten</a:t>
             </a:r>
-            <a:endParaRPr lang="de-DE"/>
           </a:p>
         </p:txBody>
       </p:sp>
@@ -2215,10 +2219,9 @@
           </a:lstStyle>
           <a:p>
             <a:r>
-              <a:rPr lang="de-DE" smtClean="0"/>
+              <a:rPr lang="de-DE"/>
               <a:t>Formatvorlage des Untertitelmasters durch Klicken bearbeiten</a:t>
             </a:r>
-            <a:endParaRPr lang="de-DE"/>
           </a:p>
         </p:txBody>
       </p:sp>
@@ -2239,7 +2242,7 @@
           <a:p>
             <a:fld id="{6CBA03CC-73C5-46A8-8DFB-B5DC4577D8E2}" type="datetimeFigureOut">
               <a:rPr lang="de-DE" smtClean="0"/>
-              <a:t>21.11.2021</a:t>
+              <a:t>07.03.2022</a:t>
             </a:fld>
             <a:endParaRPr lang="de-DE"/>
           </a:p>
@@ -2333,10 +2336,9 @@
           <a:lstStyle/>
           <a:p>
             <a:r>
-              <a:rPr lang="de-DE" smtClean="0"/>
+              <a:rPr lang="de-DE"/>
               <a:t>Titelmasterformat durch Klicken bearbeiten</a:t>
             </a:r>
-            <a:endParaRPr lang="de-DE"/>
           </a:p>
         </p:txBody>
       </p:sp>
@@ -2357,38 +2359,37 @@
           <a:p>
             <a:pPr lvl="0"/>
             <a:r>
-              <a:rPr lang="de-DE" smtClean="0"/>
+              <a:rPr lang="de-DE"/>
               <a:t>Textmasterformat bearbeiten</a:t>
             </a:r>
           </a:p>
           <a:p>
             <a:pPr lvl="1"/>
             <a:r>
-              <a:rPr lang="de-DE" smtClean="0"/>
+              <a:rPr lang="de-DE"/>
               <a:t>Zweite Ebene</a:t>
             </a:r>
           </a:p>
           <a:p>
             <a:pPr lvl="2"/>
             <a:r>
-              <a:rPr lang="de-DE" smtClean="0"/>
+              <a:rPr lang="de-DE"/>
               <a:t>Dritte Ebene</a:t>
             </a:r>
           </a:p>
           <a:p>
             <a:pPr lvl="3"/>
             <a:r>
-              <a:rPr lang="de-DE" smtClean="0"/>
+              <a:rPr lang="de-DE"/>
               <a:t>Vierte Ebene</a:t>
             </a:r>
           </a:p>
           <a:p>
             <a:pPr lvl="4"/>
             <a:r>
-              <a:rPr lang="de-DE" smtClean="0"/>
+              <a:rPr lang="de-DE"/>
               <a:t>Fünfte Ebene</a:t>
             </a:r>
-            <a:endParaRPr lang="de-DE"/>
           </a:p>
         </p:txBody>
       </p:sp>
@@ -2409,7 +2410,7 @@
           <a:p>
             <a:fld id="{6CBA03CC-73C5-46A8-8DFB-B5DC4577D8E2}" type="datetimeFigureOut">
               <a:rPr lang="de-DE" smtClean="0"/>
-              <a:t>21.11.2021</a:t>
+              <a:t>07.03.2022</a:t>
             </a:fld>
             <a:endParaRPr lang="de-DE"/>
           </a:p>
@@ -2508,10 +2509,9 @@
           <a:lstStyle/>
           <a:p>
             <a:r>
-              <a:rPr lang="de-DE" smtClean="0"/>
+              <a:rPr lang="de-DE"/>
               <a:t>Titelmasterformat durch Klicken bearbeiten</a:t>
             </a:r>
-            <a:endParaRPr lang="de-DE"/>
           </a:p>
         </p:txBody>
       </p:sp>
@@ -2537,38 +2537,37 @@
           <a:p>
             <a:pPr lvl="0"/>
             <a:r>
-              <a:rPr lang="de-DE" smtClean="0"/>
+              <a:rPr lang="de-DE"/>
               <a:t>Textmasterformat bearbeiten</a:t>
             </a:r>
           </a:p>
           <a:p>
             <a:pPr lvl="1"/>
             <a:r>
-              <a:rPr lang="de-DE" smtClean="0"/>
+              <a:rPr lang="de-DE"/>
               <a:t>Zweite Ebene</a:t>
             </a:r>
           </a:p>
           <a:p>
             <a:pPr lvl="2"/>
             <a:r>
-              <a:rPr lang="de-DE" smtClean="0"/>
+              <a:rPr lang="de-DE"/>
               <a:t>Dritte Ebene</a:t>
             </a:r>
           </a:p>
           <a:p>
             <a:pPr lvl="3"/>
             <a:r>
-              <a:rPr lang="de-DE" smtClean="0"/>
+              <a:rPr lang="de-DE"/>
               <a:t>Vierte Ebene</a:t>
             </a:r>
           </a:p>
           <a:p>
             <a:pPr lvl="4"/>
             <a:r>
-              <a:rPr lang="de-DE" smtClean="0"/>
+              <a:rPr lang="de-DE"/>
               <a:t>Fünfte Ebene</a:t>
             </a:r>
-            <a:endParaRPr lang="de-DE"/>
           </a:p>
         </p:txBody>
       </p:sp>
@@ -2589,7 +2588,7 @@
           <a:p>
             <a:fld id="{6CBA03CC-73C5-46A8-8DFB-B5DC4577D8E2}" type="datetimeFigureOut">
               <a:rPr lang="de-DE" smtClean="0"/>
-              <a:t>21.11.2021</a:t>
+              <a:t>07.03.2022</a:t>
             </a:fld>
             <a:endParaRPr lang="de-DE"/>
           </a:p>
@@ -2683,10 +2682,9 @@
           <a:lstStyle/>
           <a:p>
             <a:r>
-              <a:rPr lang="de-DE" smtClean="0"/>
+              <a:rPr lang="de-DE"/>
               <a:t>Titelmasterformat durch Klicken bearbeiten</a:t>
             </a:r>
-            <a:endParaRPr lang="de-DE"/>
           </a:p>
         </p:txBody>
       </p:sp>
@@ -2707,38 +2705,37 @@
           <a:p>
             <a:pPr lvl="0"/>
             <a:r>
-              <a:rPr lang="de-DE" smtClean="0"/>
+              <a:rPr lang="de-DE"/>
               <a:t>Textmasterformat bearbeiten</a:t>
             </a:r>
           </a:p>
           <a:p>
             <a:pPr lvl="1"/>
             <a:r>
-              <a:rPr lang="de-DE" smtClean="0"/>
+              <a:rPr lang="de-DE"/>
               <a:t>Zweite Ebene</a:t>
             </a:r>
           </a:p>
           <a:p>
             <a:pPr lvl="2"/>
             <a:r>
-              <a:rPr lang="de-DE" smtClean="0"/>
+              <a:rPr lang="de-DE"/>
               <a:t>Dritte Ebene</a:t>
             </a:r>
           </a:p>
           <a:p>
             <a:pPr lvl="3"/>
             <a:r>
-              <a:rPr lang="de-DE" smtClean="0"/>
+              <a:rPr lang="de-DE"/>
               <a:t>Vierte Ebene</a:t>
             </a:r>
           </a:p>
           <a:p>
             <a:pPr lvl="4"/>
             <a:r>
-              <a:rPr lang="de-DE" smtClean="0"/>
+              <a:rPr lang="de-DE"/>
               <a:t>Fünfte Ebene</a:t>
             </a:r>
-            <a:endParaRPr lang="de-DE"/>
           </a:p>
         </p:txBody>
       </p:sp>
@@ -2759,7 +2756,7 @@
           <a:p>
             <a:fld id="{6CBA03CC-73C5-46A8-8DFB-B5DC4577D8E2}" type="datetimeFigureOut">
               <a:rPr lang="de-DE" smtClean="0"/>
-              <a:t>21.11.2021</a:t>
+              <a:t>07.03.2022</a:t>
             </a:fld>
             <a:endParaRPr lang="de-DE"/>
           </a:p>
@@ -2862,10 +2859,9 @@
           </a:lstStyle>
           <a:p>
             <a:r>
-              <a:rPr lang="de-DE" smtClean="0"/>
+              <a:rPr lang="de-DE"/>
               <a:t>Titelmasterformat durch Klicken bearbeiten</a:t>
             </a:r>
-            <a:endParaRPr lang="de-DE"/>
           </a:p>
         </p:txBody>
       </p:sp>
@@ -2982,7 +2978,7 @@
           <a:p>
             <a:pPr lvl="0"/>
             <a:r>
-              <a:rPr lang="de-DE" smtClean="0"/>
+              <a:rPr lang="de-DE"/>
               <a:t>Textmasterformat bearbeiten</a:t>
             </a:r>
           </a:p>
@@ -3005,7 +3001,7 @@
           <a:p>
             <a:fld id="{6CBA03CC-73C5-46A8-8DFB-B5DC4577D8E2}" type="datetimeFigureOut">
               <a:rPr lang="de-DE" smtClean="0"/>
-              <a:t>21.11.2021</a:t>
+              <a:t>07.03.2022</a:t>
             </a:fld>
             <a:endParaRPr lang="de-DE"/>
           </a:p>
@@ -3099,10 +3095,9 @@
           <a:lstStyle/>
           <a:p>
             <a:r>
-              <a:rPr lang="de-DE" smtClean="0"/>
+              <a:rPr lang="de-DE"/>
               <a:t>Titelmasterformat durch Klicken bearbeiten</a:t>
             </a:r>
-            <a:endParaRPr lang="de-DE"/>
           </a:p>
         </p:txBody>
       </p:sp>
@@ -3128,38 +3123,37 @@
           <a:p>
             <a:pPr lvl="0"/>
             <a:r>
-              <a:rPr lang="de-DE" smtClean="0"/>
+              <a:rPr lang="de-DE"/>
               <a:t>Textmasterformat bearbeiten</a:t>
             </a:r>
           </a:p>
           <a:p>
             <a:pPr lvl="1"/>
             <a:r>
-              <a:rPr lang="de-DE" smtClean="0"/>
+              <a:rPr lang="de-DE"/>
               <a:t>Zweite Ebene</a:t>
             </a:r>
           </a:p>
           <a:p>
             <a:pPr lvl="2"/>
             <a:r>
-              <a:rPr lang="de-DE" smtClean="0"/>
+              <a:rPr lang="de-DE"/>
               <a:t>Dritte Ebene</a:t>
             </a:r>
           </a:p>
           <a:p>
             <a:pPr lvl="3"/>
             <a:r>
-              <a:rPr lang="de-DE" smtClean="0"/>
+              <a:rPr lang="de-DE"/>
               <a:t>Vierte Ebene</a:t>
             </a:r>
           </a:p>
           <a:p>
             <a:pPr lvl="4"/>
             <a:r>
-              <a:rPr lang="de-DE" smtClean="0"/>
+              <a:rPr lang="de-DE"/>
               <a:t>Fünfte Ebene</a:t>
             </a:r>
-            <a:endParaRPr lang="de-DE"/>
           </a:p>
         </p:txBody>
       </p:sp>
@@ -3185,38 +3179,37 @@
           <a:p>
             <a:pPr lvl="0"/>
             <a:r>
-              <a:rPr lang="de-DE" smtClean="0"/>
+              <a:rPr lang="de-DE"/>
               <a:t>Textmasterformat bearbeiten</a:t>
             </a:r>
           </a:p>
           <a:p>
             <a:pPr lvl="1"/>
             <a:r>
-              <a:rPr lang="de-DE" smtClean="0"/>
+              <a:rPr lang="de-DE"/>
               <a:t>Zweite Ebene</a:t>
             </a:r>
           </a:p>
           <a:p>
             <a:pPr lvl="2"/>
             <a:r>
-              <a:rPr lang="de-DE" smtClean="0"/>
+              <a:rPr lang="de-DE"/>
               <a:t>Dritte Ebene</a:t>
             </a:r>
           </a:p>
           <a:p>
             <a:pPr lvl="3"/>
             <a:r>
-              <a:rPr lang="de-DE" smtClean="0"/>
+              <a:rPr lang="de-DE"/>
               <a:t>Vierte Ebene</a:t>
             </a:r>
           </a:p>
           <a:p>
             <a:pPr lvl="4"/>
             <a:r>
-              <a:rPr lang="de-DE" smtClean="0"/>
+              <a:rPr lang="de-DE"/>
               <a:t>Fünfte Ebene</a:t>
             </a:r>
-            <a:endParaRPr lang="de-DE"/>
           </a:p>
         </p:txBody>
       </p:sp>
@@ -3237,7 +3230,7 @@
           <a:p>
             <a:fld id="{6CBA03CC-73C5-46A8-8DFB-B5DC4577D8E2}" type="datetimeFigureOut">
               <a:rPr lang="de-DE" smtClean="0"/>
-              <a:t>21.11.2021</a:t>
+              <a:t>07.03.2022</a:t>
             </a:fld>
             <a:endParaRPr lang="de-DE"/>
           </a:p>
@@ -3336,10 +3329,9 @@
           <a:lstStyle/>
           <a:p>
             <a:r>
-              <a:rPr lang="de-DE" smtClean="0"/>
+              <a:rPr lang="de-DE"/>
               <a:t>Titelmasterformat durch Klicken bearbeiten</a:t>
             </a:r>
-            <a:endParaRPr lang="de-DE"/>
           </a:p>
         </p:txBody>
       </p:sp>
@@ -3402,7 +3394,7 @@
           <a:p>
             <a:pPr lvl="0"/>
             <a:r>
-              <a:rPr lang="de-DE" smtClean="0"/>
+              <a:rPr lang="de-DE"/>
               <a:t>Textmasterformat bearbeiten</a:t>
             </a:r>
           </a:p>
@@ -3430,38 +3422,37 @@
           <a:p>
             <a:pPr lvl="0"/>
             <a:r>
-              <a:rPr lang="de-DE" smtClean="0"/>
+              <a:rPr lang="de-DE"/>
               <a:t>Textmasterformat bearbeiten</a:t>
             </a:r>
           </a:p>
           <a:p>
             <a:pPr lvl="1"/>
             <a:r>
-              <a:rPr lang="de-DE" smtClean="0"/>
+              <a:rPr lang="de-DE"/>
               <a:t>Zweite Ebene</a:t>
             </a:r>
           </a:p>
           <a:p>
             <a:pPr lvl="2"/>
             <a:r>
-              <a:rPr lang="de-DE" smtClean="0"/>
+              <a:rPr lang="de-DE"/>
               <a:t>Dritte Ebene</a:t>
             </a:r>
           </a:p>
           <a:p>
             <a:pPr lvl="3"/>
             <a:r>
-              <a:rPr lang="de-DE" smtClean="0"/>
+              <a:rPr lang="de-DE"/>
               <a:t>Vierte Ebene</a:t>
             </a:r>
           </a:p>
           <a:p>
             <a:pPr lvl="4"/>
             <a:r>
-              <a:rPr lang="de-DE" smtClean="0"/>
+              <a:rPr lang="de-DE"/>
               <a:t>Fünfte Ebene</a:t>
             </a:r>
-            <a:endParaRPr lang="de-DE"/>
           </a:p>
         </p:txBody>
       </p:sp>
@@ -3524,7 +3515,7 @@
           <a:p>
             <a:pPr lvl="0"/>
             <a:r>
-              <a:rPr lang="de-DE" smtClean="0"/>
+              <a:rPr lang="de-DE"/>
               <a:t>Textmasterformat bearbeiten</a:t>
             </a:r>
           </a:p>
@@ -3552,38 +3543,37 @@
           <a:p>
             <a:pPr lvl="0"/>
             <a:r>
-              <a:rPr lang="de-DE" smtClean="0"/>
+              <a:rPr lang="de-DE"/>
               <a:t>Textmasterformat bearbeiten</a:t>
             </a:r>
           </a:p>
           <a:p>
             <a:pPr lvl="1"/>
             <a:r>
-              <a:rPr lang="de-DE" smtClean="0"/>
+              <a:rPr lang="de-DE"/>
               <a:t>Zweite Ebene</a:t>
             </a:r>
           </a:p>
           <a:p>
             <a:pPr lvl="2"/>
             <a:r>
-              <a:rPr lang="de-DE" smtClean="0"/>
+              <a:rPr lang="de-DE"/>
               <a:t>Dritte Ebene</a:t>
             </a:r>
           </a:p>
           <a:p>
             <a:pPr lvl="3"/>
             <a:r>
-              <a:rPr lang="de-DE" smtClean="0"/>
+              <a:rPr lang="de-DE"/>
               <a:t>Vierte Ebene</a:t>
             </a:r>
           </a:p>
           <a:p>
             <a:pPr lvl="4"/>
             <a:r>
-              <a:rPr lang="de-DE" smtClean="0"/>
+              <a:rPr lang="de-DE"/>
               <a:t>Fünfte Ebene</a:t>
             </a:r>
-            <a:endParaRPr lang="de-DE"/>
           </a:p>
         </p:txBody>
       </p:sp>
@@ -3604,7 +3594,7 @@
           <a:p>
             <a:fld id="{6CBA03CC-73C5-46A8-8DFB-B5DC4577D8E2}" type="datetimeFigureOut">
               <a:rPr lang="de-DE" smtClean="0"/>
-              <a:t>21.11.2021</a:t>
+              <a:t>07.03.2022</a:t>
             </a:fld>
             <a:endParaRPr lang="de-DE"/>
           </a:p>
@@ -3698,10 +3688,9 @@
           <a:lstStyle/>
           <a:p>
             <a:r>
-              <a:rPr lang="de-DE" smtClean="0"/>
+              <a:rPr lang="de-DE"/>
               <a:t>Titelmasterformat durch Klicken bearbeiten</a:t>
             </a:r>
-            <a:endParaRPr lang="de-DE"/>
           </a:p>
         </p:txBody>
       </p:sp>
@@ -3722,7 +3711,7 @@
           <a:p>
             <a:fld id="{6CBA03CC-73C5-46A8-8DFB-B5DC4577D8E2}" type="datetimeFigureOut">
               <a:rPr lang="de-DE" smtClean="0"/>
-              <a:t>21.11.2021</a:t>
+              <a:t>07.03.2022</a:t>
             </a:fld>
             <a:endParaRPr lang="de-DE"/>
           </a:p>
@@ -3817,7 +3806,7 @@
           <a:p>
             <a:fld id="{6CBA03CC-73C5-46A8-8DFB-B5DC4577D8E2}" type="datetimeFigureOut">
               <a:rPr lang="de-DE" smtClean="0"/>
-              <a:t>21.11.2021</a:t>
+              <a:t>07.03.2022</a:t>
             </a:fld>
             <a:endParaRPr lang="de-DE"/>
           </a:p>
@@ -3920,10 +3909,9 @@
           </a:lstStyle>
           <a:p>
             <a:r>
-              <a:rPr lang="de-DE" smtClean="0"/>
+              <a:rPr lang="de-DE"/>
               <a:t>Titelmasterformat durch Klicken bearbeiten</a:t>
             </a:r>
-            <a:endParaRPr lang="de-DE"/>
           </a:p>
         </p:txBody>
       </p:sp>
@@ -3977,38 +3965,37 @@
           <a:p>
             <a:pPr lvl="0"/>
             <a:r>
-              <a:rPr lang="de-DE" smtClean="0"/>
+              <a:rPr lang="de-DE"/>
               <a:t>Textmasterformat bearbeiten</a:t>
             </a:r>
           </a:p>
           <a:p>
             <a:pPr lvl="1"/>
             <a:r>
-              <a:rPr lang="de-DE" smtClean="0"/>
+              <a:rPr lang="de-DE"/>
               <a:t>Zweite Ebene</a:t>
             </a:r>
           </a:p>
           <a:p>
             <a:pPr lvl="2"/>
             <a:r>
-              <a:rPr lang="de-DE" smtClean="0"/>
+              <a:rPr lang="de-DE"/>
               <a:t>Dritte Ebene</a:t>
             </a:r>
           </a:p>
           <a:p>
             <a:pPr lvl="3"/>
             <a:r>
-              <a:rPr lang="de-DE" smtClean="0"/>
+              <a:rPr lang="de-DE"/>
               <a:t>Vierte Ebene</a:t>
             </a:r>
           </a:p>
           <a:p>
             <a:pPr lvl="4"/>
             <a:r>
-              <a:rPr lang="de-DE" smtClean="0"/>
+              <a:rPr lang="de-DE"/>
               <a:t>Fünfte Ebene</a:t>
             </a:r>
-            <a:endParaRPr lang="de-DE"/>
           </a:p>
         </p:txBody>
       </p:sp>
@@ -4071,7 +4058,7 @@
           <a:p>
             <a:pPr lvl="0"/>
             <a:r>
-              <a:rPr lang="de-DE" smtClean="0"/>
+              <a:rPr lang="de-DE"/>
               <a:t>Textmasterformat bearbeiten</a:t>
             </a:r>
           </a:p>
@@ -4094,7 +4081,7 @@
           <a:p>
             <a:fld id="{6CBA03CC-73C5-46A8-8DFB-B5DC4577D8E2}" type="datetimeFigureOut">
               <a:rPr lang="de-DE" smtClean="0"/>
-              <a:t>21.11.2021</a:t>
+              <a:t>07.03.2022</a:t>
             </a:fld>
             <a:endParaRPr lang="de-DE"/>
           </a:p>
@@ -4197,10 +4184,9 @@
           </a:lstStyle>
           <a:p>
             <a:r>
-              <a:rPr lang="de-DE" smtClean="0"/>
+              <a:rPr lang="de-DE"/>
               <a:t>Titelmasterformat durch Klicken bearbeiten</a:t>
             </a:r>
-            <a:endParaRPr lang="de-DE"/>
           </a:p>
         </p:txBody>
       </p:sp>
@@ -4324,7 +4310,7 @@
           <a:p>
             <a:pPr lvl="0"/>
             <a:r>
-              <a:rPr lang="de-DE" smtClean="0"/>
+              <a:rPr lang="de-DE"/>
               <a:t>Textmasterformat bearbeiten</a:t>
             </a:r>
           </a:p>
@@ -4347,7 +4333,7 @@
           <a:p>
             <a:fld id="{6CBA03CC-73C5-46A8-8DFB-B5DC4577D8E2}" type="datetimeFigureOut">
               <a:rPr lang="de-DE" smtClean="0"/>
-              <a:t>21.11.2021</a:t>
+              <a:t>07.03.2022</a:t>
             </a:fld>
             <a:endParaRPr lang="de-DE"/>
           </a:p>
@@ -4456,10 +4442,9 @@
           <a:lstStyle/>
           <a:p>
             <a:r>
-              <a:rPr lang="de-DE" smtClean="0"/>
+              <a:rPr lang="de-DE"/>
               <a:t>Titelmasterformat durch Klicken bearbeiten</a:t>
             </a:r>
-            <a:endParaRPr lang="de-DE"/>
           </a:p>
         </p:txBody>
       </p:sp>
@@ -4490,38 +4475,37 @@
           <a:p>
             <a:pPr lvl="0"/>
             <a:r>
-              <a:rPr lang="de-DE" smtClean="0"/>
+              <a:rPr lang="de-DE"/>
               <a:t>Textmasterformat bearbeiten</a:t>
             </a:r>
           </a:p>
           <a:p>
             <a:pPr lvl="1"/>
             <a:r>
-              <a:rPr lang="de-DE" smtClean="0"/>
+              <a:rPr lang="de-DE"/>
               <a:t>Zweite Ebene</a:t>
             </a:r>
           </a:p>
           <a:p>
             <a:pPr lvl="2"/>
             <a:r>
-              <a:rPr lang="de-DE" smtClean="0"/>
+              <a:rPr lang="de-DE"/>
               <a:t>Dritte Ebene</a:t>
             </a:r>
           </a:p>
           <a:p>
             <a:pPr lvl="3"/>
             <a:r>
-              <a:rPr lang="de-DE" smtClean="0"/>
+              <a:rPr lang="de-DE"/>
               <a:t>Vierte Ebene</a:t>
             </a:r>
           </a:p>
           <a:p>
             <a:pPr lvl="4"/>
             <a:r>
-              <a:rPr lang="de-DE" smtClean="0"/>
+              <a:rPr lang="de-DE"/>
               <a:t>Fünfte Ebene</a:t>
             </a:r>
-            <a:endParaRPr lang="de-DE"/>
           </a:p>
         </p:txBody>
       </p:sp>
@@ -4560,7 +4544,7 @@
           <a:p>
             <a:fld id="{6CBA03CC-73C5-46A8-8DFB-B5DC4577D8E2}" type="datetimeFigureOut">
               <a:rPr lang="de-DE" smtClean="0"/>
-              <a:t>21.11.2021</a:t>
+              <a:t>07.03.2022</a:t>
             </a:fld>
             <a:endParaRPr lang="de-DE"/>
           </a:p>
@@ -4981,7 +4965,7 @@
           <a:lstStyle/>
           <a:p>
             <a:r>
-              <a:rPr lang="de-DE" dirty="0" smtClean="0"/>
+              <a:rPr lang="de-DE" dirty="0"/>
               <a:t>Infrastructure </a:t>
             </a:r>
             <a:r>
@@ -4990,13 +4974,8 @@
             </a:r>
             <a:r>
               <a:rPr lang="de-DE" dirty="0"/>
-              <a:t> Code mit </a:t>
-            </a:r>
-            <a:r>
-              <a:rPr lang="de-DE" dirty="0" smtClean="0"/>
-              <a:t>Terraform</a:t>
-            </a:r>
-            <a:endParaRPr lang="de-DE" dirty="0"/>
+              <a:t> Code mit Terraform</a:t>
+            </a:r>
           </a:p>
         </p:txBody>
       </p:sp>
@@ -5016,16 +4995,15 @@
           <a:lstStyle/>
           <a:p>
             <a:r>
-              <a:rPr lang="de-DE" dirty="0" smtClean="0"/>
+              <a:rPr lang="de-DE" dirty="0"/>
               <a:t>Dominik Jakielski</a:t>
             </a:r>
           </a:p>
           <a:p>
             <a:r>
-              <a:rPr lang="de-DE" dirty="0" smtClean="0"/>
+              <a:rPr lang="de-DE" dirty="0"/>
               <a:t>Stefan Schmalstieg</a:t>
             </a:r>
-            <a:endParaRPr lang="de-DE" dirty="0"/>
           </a:p>
         </p:txBody>
       </p:sp>
@@ -5075,10 +5053,9 @@
           <a:lstStyle/>
           <a:p>
             <a:r>
-              <a:rPr lang="de-DE" dirty="0" smtClean="0"/>
+              <a:rPr lang="de-DE" dirty="0"/>
               <a:t>Terraform </a:t>
             </a:r>
-            <a:endParaRPr lang="de-DE" dirty="0"/>
           </a:p>
         </p:txBody>
       </p:sp>
@@ -5100,34 +5077,30 @@
           <a:lstStyle/>
           <a:p>
             <a:r>
-              <a:rPr lang="de-DE" dirty="0" smtClean="0"/>
+              <a:rPr lang="de-DE" dirty="0"/>
               <a:t>Open Source </a:t>
             </a:r>
             <a:r>
-              <a:rPr lang="de-DE" dirty="0" err="1" smtClean="0"/>
+              <a:rPr lang="de-DE" dirty="0" err="1"/>
               <a:t>Infrasturcture</a:t>
             </a:r>
             <a:r>
-              <a:rPr lang="de-DE" dirty="0" smtClean="0"/>
+              <a:rPr lang="de-DE" dirty="0"/>
               <a:t> </a:t>
             </a:r>
             <a:r>
-              <a:rPr lang="de-DE" dirty="0" err="1" smtClean="0"/>
+              <a:rPr lang="de-DE" dirty="0" err="1"/>
               <a:t>Provisioning</a:t>
             </a:r>
             <a:r>
-              <a:rPr lang="de-DE" dirty="0" smtClean="0"/>
+              <a:rPr lang="de-DE" dirty="0"/>
               <a:t> Tool </a:t>
             </a:r>
           </a:p>
           <a:p>
             <a:r>
-              <a:rPr lang="de-DE" dirty="0" smtClean="0"/>
-              <a:t>Deklarative Konfigurationssprache (</a:t>
-            </a:r>
-            <a:r>
-              <a:rPr lang="de-DE" dirty="0"/>
-              <a:t>HCL - </a:t>
+              <a:rPr lang="de-DE" dirty="0"/>
+              <a:t>Deklarative Konfigurationssprache (HCL - </a:t>
             </a:r>
             <a:r>
               <a:rPr lang="de-DE" dirty="0" err="1"/>
@@ -5151,61 +5124,56 @@
             </a:r>
             <a:r>
               <a:rPr lang="de-DE" dirty="0"/>
-              <a:t> </a:t>
-            </a:r>
-            <a:r>
-              <a:rPr lang="de-DE" dirty="0" smtClean="0"/>
-              <a:t>)</a:t>
+              <a:t> )</a:t>
             </a:r>
           </a:p>
           <a:p>
             <a:pPr lvl="1"/>
             <a:r>
-              <a:rPr lang="de-DE" dirty="0" smtClean="0"/>
+              <a:rPr lang="de-DE" dirty="0"/>
               <a:t>bietet einheitliche Syntax unabhängig von der Umgebung in der Ressourcen </a:t>
             </a:r>
             <a:r>
-              <a:rPr lang="de-DE" dirty="0" err="1" smtClean="0"/>
+              <a:rPr lang="de-DE" dirty="0" err="1"/>
               <a:t>provisioniert</a:t>
             </a:r>
             <a:r>
-              <a:rPr lang="de-DE" dirty="0" smtClean="0"/>
+              <a:rPr lang="de-DE" dirty="0"/>
               <a:t> werden sollen </a:t>
             </a:r>
           </a:p>
           <a:p>
             <a:r>
-              <a:rPr lang="de-DE" dirty="0" smtClean="0"/>
+              <a:rPr lang="de-DE" dirty="0"/>
               <a:t>CLI zum Planen, </a:t>
             </a:r>
             <a:r>
-              <a:rPr lang="de-DE" dirty="0" err="1" smtClean="0"/>
+              <a:rPr lang="de-DE" dirty="0" err="1"/>
               <a:t>Deployen</a:t>
             </a:r>
             <a:r>
-              <a:rPr lang="de-DE" dirty="0" smtClean="0"/>
+              <a:rPr lang="de-DE" dirty="0"/>
               <a:t> und Abreißen der Konfiguration</a:t>
             </a:r>
           </a:p>
           <a:p>
             <a:r>
-              <a:rPr lang="de-DE" dirty="0" smtClean="0"/>
+              <a:rPr lang="de-DE" dirty="0"/>
               <a:t>Breiter Support für unterschiedliche Clouds</a:t>
             </a:r>
           </a:p>
           <a:p>
             <a:pPr lvl="1"/>
             <a:r>
-              <a:rPr lang="de-DE" dirty="0" smtClean="0"/>
+              <a:rPr lang="de-DE" dirty="0"/>
               <a:t>&gt; 100 Provider für diverse Clouds und Frameworks</a:t>
             </a:r>
           </a:p>
           <a:p>
             <a:r>
-              <a:rPr lang="de-DE" dirty="0" smtClean="0"/>
+              <a:rPr lang="de-DE" dirty="0"/>
               <a:t>Große Community</a:t>
             </a:r>
-            <a:endParaRPr lang="de-DE" dirty="0"/>
           </a:p>
         </p:txBody>
       </p:sp>
@@ -5255,10 +5223,9 @@
           <a:lstStyle/>
           <a:p>
             <a:r>
-              <a:rPr lang="de-DE" dirty="0" smtClean="0"/>
+              <a:rPr lang="de-DE" dirty="0"/>
               <a:t>Terraform State</a:t>
             </a:r>
-            <a:endParaRPr lang="de-DE" dirty="0"/>
           </a:p>
         </p:txBody>
       </p:sp>
@@ -5278,13 +5245,13 @@
           <a:lstStyle/>
           <a:p>
             <a:r>
-              <a:rPr lang="de-DE" dirty="0" smtClean="0"/>
+              <a:rPr lang="de-DE" dirty="0"/>
               <a:t>Terraform speichert Informationen über die gemanagte Infrastruktur in einem State-File</a:t>
             </a:r>
           </a:p>
           <a:p>
             <a:r>
-              <a:rPr lang="de-DE" dirty="0" smtClean="0"/>
+              <a:rPr lang="de-DE" dirty="0"/>
               <a:t>Mapping zwischen real existierender Infrastruktur und der Konfiguration</a:t>
             </a:r>
           </a:p>
@@ -5364,7 +5331,7 @@
               <a:tabLst/>
             </a:pPr>
             <a:r>
-              <a:rPr kumimoji="0" lang="de-DE" altLang="de-DE" b="0" i="0" u="none" strike="noStrike" cap="none" normalizeH="0" baseline="0" dirty="0" smtClean="0">
+              <a:rPr kumimoji="0" lang="de-DE" altLang="de-DE" b="0" i="0" u="none" strike="noStrike" cap="none" normalizeH="0" baseline="0" dirty="0">
                 <a:ln>
                   <a:noFill/>
                 </a:ln>
@@ -5377,7 +5344,7 @@
               <a:t>{</a:t>
             </a:r>
             <a:br>
-              <a:rPr kumimoji="0" lang="de-DE" altLang="de-DE" b="0" i="0" u="none" strike="noStrike" cap="none" normalizeH="0" baseline="0" dirty="0" smtClean="0">
+              <a:rPr kumimoji="0" lang="de-DE" altLang="de-DE" b="0" i="0" u="none" strike="noStrike" cap="none" normalizeH="0" baseline="0" dirty="0">
                 <a:ln>
                   <a:noFill/>
                 </a:ln>
@@ -5389,7 +5356,7 @@
               </a:rPr>
             </a:br>
             <a:r>
-              <a:rPr kumimoji="0" lang="de-DE" altLang="de-DE" b="0" i="0" u="none" strike="noStrike" cap="none" normalizeH="0" baseline="0" dirty="0" smtClean="0">
+              <a:rPr kumimoji="0" lang="de-DE" altLang="de-DE" b="0" i="0" u="none" strike="noStrike" cap="none" normalizeH="0" baseline="0" dirty="0">
                 <a:ln>
                   <a:noFill/>
                 </a:ln>
@@ -5402,7 +5369,7 @@
               <a:t>  "</a:t>
             </a:r>
             <a:r>
-              <a:rPr kumimoji="0" lang="de-DE" altLang="de-DE" b="0" i="0" u="none" strike="noStrike" cap="none" normalizeH="0" baseline="0" dirty="0" err="1" smtClean="0">
+              <a:rPr kumimoji="0" lang="de-DE" altLang="de-DE" b="0" i="0" u="none" strike="noStrike" cap="none" normalizeH="0" baseline="0" dirty="0" err="1">
                 <a:ln>
                   <a:noFill/>
                 </a:ln>
@@ -5415,7 +5382,7 @@
               <a:t>version</a:t>
             </a:r>
             <a:r>
-              <a:rPr kumimoji="0" lang="de-DE" altLang="de-DE" b="0" i="0" u="none" strike="noStrike" cap="none" normalizeH="0" baseline="0" dirty="0" smtClean="0">
+              <a:rPr kumimoji="0" lang="de-DE" altLang="de-DE" b="0" i="0" u="none" strike="noStrike" cap="none" normalizeH="0" baseline="0" dirty="0">
                 <a:ln>
                   <a:noFill/>
                 </a:ln>
@@ -5428,7 +5395,7 @@
               <a:t>": 4,</a:t>
             </a:r>
             <a:br>
-              <a:rPr kumimoji="0" lang="de-DE" altLang="de-DE" b="0" i="0" u="none" strike="noStrike" cap="none" normalizeH="0" baseline="0" dirty="0" smtClean="0">
+              <a:rPr kumimoji="0" lang="de-DE" altLang="de-DE" b="0" i="0" u="none" strike="noStrike" cap="none" normalizeH="0" baseline="0" dirty="0">
                 <a:ln>
                   <a:noFill/>
                 </a:ln>
@@ -5440,7 +5407,7 @@
               </a:rPr>
             </a:br>
             <a:r>
-              <a:rPr kumimoji="0" lang="de-DE" altLang="de-DE" b="0" i="0" u="none" strike="noStrike" cap="none" normalizeH="0" baseline="0" dirty="0" smtClean="0">
+              <a:rPr kumimoji="0" lang="de-DE" altLang="de-DE" b="0" i="0" u="none" strike="noStrike" cap="none" normalizeH="0" baseline="0" dirty="0">
                 <a:ln>
                   <a:noFill/>
                 </a:ln>
@@ -5453,7 +5420,7 @@
               <a:t>  "</a:t>
             </a:r>
             <a:r>
-              <a:rPr kumimoji="0" lang="de-DE" altLang="de-DE" b="0" i="0" u="none" strike="noStrike" cap="none" normalizeH="0" baseline="0" dirty="0" err="1" smtClean="0">
+              <a:rPr kumimoji="0" lang="de-DE" altLang="de-DE" b="0" i="0" u="none" strike="noStrike" cap="none" normalizeH="0" baseline="0" dirty="0" err="1">
                 <a:ln>
                   <a:noFill/>
                 </a:ln>
@@ -5466,7 +5433,7 @@
               <a:t>terraform_version</a:t>
             </a:r>
             <a:r>
-              <a:rPr kumimoji="0" lang="de-DE" altLang="de-DE" b="0" i="0" u="none" strike="noStrike" cap="none" normalizeH="0" baseline="0" dirty="0" smtClean="0">
+              <a:rPr kumimoji="0" lang="de-DE" altLang="de-DE" b="0" i="0" u="none" strike="noStrike" cap="none" normalizeH="0" baseline="0" dirty="0">
                 <a:ln>
                   <a:noFill/>
                 </a:ln>
@@ -5479,7 +5446,7 @@
               <a:t>": "1.0.11",</a:t>
             </a:r>
             <a:br>
-              <a:rPr kumimoji="0" lang="de-DE" altLang="de-DE" b="0" i="0" u="none" strike="noStrike" cap="none" normalizeH="0" baseline="0" dirty="0" smtClean="0">
+              <a:rPr kumimoji="0" lang="de-DE" altLang="de-DE" b="0" i="0" u="none" strike="noStrike" cap="none" normalizeH="0" baseline="0" dirty="0">
                 <a:ln>
                   <a:noFill/>
                 </a:ln>
@@ -5491,7 +5458,7 @@
               </a:rPr>
             </a:br>
             <a:r>
-              <a:rPr kumimoji="0" lang="de-DE" altLang="de-DE" b="0" i="0" u="none" strike="noStrike" cap="none" normalizeH="0" baseline="0" dirty="0" smtClean="0">
+              <a:rPr kumimoji="0" lang="de-DE" altLang="de-DE" b="0" i="0" u="none" strike="noStrike" cap="none" normalizeH="0" baseline="0" dirty="0">
                 <a:ln>
                   <a:noFill/>
                 </a:ln>
@@ -5504,7 +5471,7 @@
               <a:t>  "</a:t>
             </a:r>
             <a:r>
-              <a:rPr kumimoji="0" lang="de-DE" altLang="de-DE" b="0" i="0" u="none" strike="noStrike" cap="none" normalizeH="0" baseline="0" dirty="0" err="1" smtClean="0">
+              <a:rPr kumimoji="0" lang="de-DE" altLang="de-DE" b="0" i="0" u="none" strike="noStrike" cap="none" normalizeH="0" baseline="0" dirty="0" err="1">
                 <a:ln>
                   <a:noFill/>
                 </a:ln>
@@ -5517,7 +5484,7 @@
               <a:t>serial</a:t>
             </a:r>
             <a:r>
-              <a:rPr kumimoji="0" lang="de-DE" altLang="de-DE" b="0" i="0" u="none" strike="noStrike" cap="none" normalizeH="0" baseline="0" dirty="0" smtClean="0">
+              <a:rPr kumimoji="0" lang="de-DE" altLang="de-DE" b="0" i="0" u="none" strike="noStrike" cap="none" normalizeH="0" baseline="0" dirty="0">
                 <a:ln>
                   <a:noFill/>
                 </a:ln>
@@ -5530,7 +5497,7 @@
               <a:t>": 4,</a:t>
             </a:r>
             <a:br>
-              <a:rPr kumimoji="0" lang="de-DE" altLang="de-DE" b="0" i="0" u="none" strike="noStrike" cap="none" normalizeH="0" baseline="0" dirty="0" smtClean="0">
+              <a:rPr kumimoji="0" lang="de-DE" altLang="de-DE" b="0" i="0" u="none" strike="noStrike" cap="none" normalizeH="0" baseline="0" dirty="0">
                 <a:ln>
                   <a:noFill/>
                 </a:ln>
@@ -5542,7 +5509,7 @@
               </a:rPr>
             </a:br>
             <a:r>
-              <a:rPr kumimoji="0" lang="de-DE" altLang="de-DE" b="0" i="0" u="none" strike="noStrike" cap="none" normalizeH="0" baseline="0" dirty="0" smtClean="0">
+              <a:rPr kumimoji="0" lang="de-DE" altLang="de-DE" b="0" i="0" u="none" strike="noStrike" cap="none" normalizeH="0" baseline="0" dirty="0">
                 <a:ln>
                   <a:noFill/>
                 </a:ln>
@@ -5555,7 +5522,7 @@
               <a:t>  "</a:t>
             </a:r>
             <a:r>
-              <a:rPr kumimoji="0" lang="de-DE" altLang="de-DE" b="0" i="0" u="none" strike="noStrike" cap="none" normalizeH="0" baseline="0" dirty="0" err="1" smtClean="0">
+              <a:rPr kumimoji="0" lang="de-DE" altLang="de-DE" b="0" i="0" u="none" strike="noStrike" cap="none" normalizeH="0" baseline="0" dirty="0" err="1">
                 <a:ln>
                   <a:noFill/>
                 </a:ln>
@@ -5568,7 +5535,7 @@
               <a:t>lineage</a:t>
             </a:r>
             <a:r>
-              <a:rPr kumimoji="0" lang="de-DE" altLang="de-DE" b="0" i="0" u="none" strike="noStrike" cap="none" normalizeH="0" baseline="0" dirty="0" smtClean="0">
+              <a:rPr kumimoji="0" lang="de-DE" altLang="de-DE" b="0" i="0" u="none" strike="noStrike" cap="none" normalizeH="0" baseline="0" dirty="0">
                 <a:ln>
                   <a:noFill/>
                 </a:ln>
@@ -5581,7 +5548,7 @@
               <a:t>": "cbc57e67-26fb-7ec5-c00f-8b3b7104cef1",</a:t>
             </a:r>
             <a:br>
-              <a:rPr kumimoji="0" lang="de-DE" altLang="de-DE" b="0" i="0" u="none" strike="noStrike" cap="none" normalizeH="0" baseline="0" dirty="0" smtClean="0">
+              <a:rPr kumimoji="0" lang="de-DE" altLang="de-DE" b="0" i="0" u="none" strike="noStrike" cap="none" normalizeH="0" baseline="0" dirty="0">
                 <a:ln>
                   <a:noFill/>
                 </a:ln>
@@ -5593,7 +5560,7 @@
               </a:rPr>
             </a:br>
             <a:r>
-              <a:rPr kumimoji="0" lang="de-DE" altLang="de-DE" b="0" i="0" u="none" strike="noStrike" cap="none" normalizeH="0" baseline="0" dirty="0" smtClean="0">
+              <a:rPr kumimoji="0" lang="de-DE" altLang="de-DE" b="0" i="0" u="none" strike="noStrike" cap="none" normalizeH="0" baseline="0" dirty="0">
                 <a:ln>
                   <a:noFill/>
                 </a:ln>
@@ -5606,7 +5573,7 @@
               <a:t>  "</a:t>
             </a:r>
             <a:r>
-              <a:rPr kumimoji="0" lang="de-DE" altLang="de-DE" b="0" i="0" u="none" strike="noStrike" cap="none" normalizeH="0" baseline="0" dirty="0" err="1" smtClean="0">
+              <a:rPr kumimoji="0" lang="de-DE" altLang="de-DE" b="0" i="0" u="none" strike="noStrike" cap="none" normalizeH="0" baseline="0" dirty="0" err="1">
                 <a:ln>
                   <a:noFill/>
                 </a:ln>
@@ -5619,7 +5586,7 @@
               <a:t>resources</a:t>
             </a:r>
             <a:r>
-              <a:rPr kumimoji="0" lang="de-DE" altLang="de-DE" b="0" i="0" u="none" strike="noStrike" cap="none" normalizeH="0" baseline="0" dirty="0" smtClean="0">
+              <a:rPr kumimoji="0" lang="de-DE" altLang="de-DE" b="0" i="0" u="none" strike="noStrike" cap="none" normalizeH="0" baseline="0" dirty="0">
                 <a:ln>
                   <a:noFill/>
                 </a:ln>
@@ -5632,7 +5599,7 @@
               <a:t>": [</a:t>
             </a:r>
             <a:br>
-              <a:rPr kumimoji="0" lang="de-DE" altLang="de-DE" b="0" i="0" u="none" strike="noStrike" cap="none" normalizeH="0" baseline="0" dirty="0" smtClean="0">
+              <a:rPr kumimoji="0" lang="de-DE" altLang="de-DE" b="0" i="0" u="none" strike="noStrike" cap="none" normalizeH="0" baseline="0" dirty="0">
                 <a:ln>
                   <a:noFill/>
                 </a:ln>
@@ -5644,7 +5611,7 @@
               </a:rPr>
             </a:br>
             <a:r>
-              <a:rPr kumimoji="0" lang="de-DE" altLang="de-DE" b="0" i="0" u="none" strike="noStrike" cap="none" normalizeH="0" baseline="0" dirty="0" smtClean="0">
+              <a:rPr kumimoji="0" lang="de-DE" altLang="de-DE" b="0" i="0" u="none" strike="noStrike" cap="none" normalizeH="0" baseline="0" dirty="0">
                 <a:ln>
                   <a:noFill/>
                 </a:ln>
@@ -5657,7 +5624,7 @@
               <a:t>    {</a:t>
             </a:r>
             <a:br>
-              <a:rPr kumimoji="0" lang="de-DE" altLang="de-DE" b="0" i="0" u="none" strike="noStrike" cap="none" normalizeH="0" baseline="0" dirty="0" smtClean="0">
+              <a:rPr kumimoji="0" lang="de-DE" altLang="de-DE" b="0" i="0" u="none" strike="noStrike" cap="none" normalizeH="0" baseline="0" dirty="0">
                 <a:ln>
                   <a:noFill/>
                 </a:ln>
@@ -5669,7 +5636,7 @@
               </a:rPr>
             </a:br>
             <a:r>
-              <a:rPr kumimoji="0" lang="de-DE" altLang="de-DE" b="0" i="0" u="none" strike="noStrike" cap="none" normalizeH="0" baseline="0" dirty="0" smtClean="0">
+              <a:rPr kumimoji="0" lang="de-DE" altLang="de-DE" b="0" i="0" u="none" strike="noStrike" cap="none" normalizeH="0" baseline="0" dirty="0">
                 <a:ln>
                   <a:noFill/>
                 </a:ln>
@@ -5682,7 +5649,7 @@
               <a:t>      "</a:t>
             </a:r>
             <a:r>
-              <a:rPr kumimoji="0" lang="de-DE" altLang="de-DE" b="0" i="0" u="none" strike="noStrike" cap="none" normalizeH="0" baseline="0" dirty="0" err="1" smtClean="0">
+              <a:rPr kumimoji="0" lang="de-DE" altLang="de-DE" b="0" i="0" u="none" strike="noStrike" cap="none" normalizeH="0" baseline="0" dirty="0" err="1">
                 <a:ln>
                   <a:noFill/>
                 </a:ln>
@@ -5695,7 +5662,7 @@
               <a:t>mode</a:t>
             </a:r>
             <a:r>
-              <a:rPr kumimoji="0" lang="de-DE" altLang="de-DE" b="0" i="0" u="none" strike="noStrike" cap="none" normalizeH="0" baseline="0" dirty="0" smtClean="0">
+              <a:rPr kumimoji="0" lang="de-DE" altLang="de-DE" b="0" i="0" u="none" strike="noStrike" cap="none" normalizeH="0" baseline="0" dirty="0">
                 <a:ln>
                   <a:noFill/>
                 </a:ln>
@@ -5708,7 +5675,7 @@
               <a:t>": "</a:t>
             </a:r>
             <a:r>
-              <a:rPr kumimoji="0" lang="de-DE" altLang="de-DE" b="0" i="0" u="none" strike="noStrike" cap="none" normalizeH="0" baseline="0" dirty="0" err="1" smtClean="0">
+              <a:rPr kumimoji="0" lang="de-DE" altLang="de-DE" b="0" i="0" u="none" strike="noStrike" cap="none" normalizeH="0" baseline="0" dirty="0" err="1">
                 <a:ln>
                   <a:noFill/>
                 </a:ln>
@@ -5721,7 +5688,7 @@
               <a:t>managed</a:t>
             </a:r>
             <a:r>
-              <a:rPr kumimoji="0" lang="de-DE" altLang="de-DE" b="0" i="0" u="none" strike="noStrike" cap="none" normalizeH="0" baseline="0" dirty="0" smtClean="0">
+              <a:rPr kumimoji="0" lang="de-DE" altLang="de-DE" b="0" i="0" u="none" strike="noStrike" cap="none" normalizeH="0" baseline="0" dirty="0">
                 <a:ln>
                   <a:noFill/>
                 </a:ln>
@@ -5734,7 +5701,7 @@
               <a:t>",</a:t>
             </a:r>
             <a:br>
-              <a:rPr kumimoji="0" lang="de-DE" altLang="de-DE" b="0" i="0" u="none" strike="noStrike" cap="none" normalizeH="0" baseline="0" dirty="0" smtClean="0">
+              <a:rPr kumimoji="0" lang="de-DE" altLang="de-DE" b="0" i="0" u="none" strike="noStrike" cap="none" normalizeH="0" baseline="0" dirty="0">
                 <a:ln>
                   <a:noFill/>
                 </a:ln>
@@ -5746,7 +5713,7 @@
               </a:rPr>
             </a:br>
             <a:r>
-              <a:rPr kumimoji="0" lang="de-DE" altLang="de-DE" b="0" i="0" u="none" strike="noStrike" cap="none" normalizeH="0" baseline="0" dirty="0" smtClean="0">
+              <a:rPr kumimoji="0" lang="de-DE" altLang="de-DE" b="0" i="0" u="none" strike="noStrike" cap="none" normalizeH="0" baseline="0" dirty="0">
                 <a:ln>
                   <a:noFill/>
                 </a:ln>
@@ -5759,7 +5726,7 @@
               <a:t>      "type": "</a:t>
             </a:r>
             <a:r>
-              <a:rPr kumimoji="0" lang="de-DE" altLang="de-DE" b="0" i="0" u="none" strike="noStrike" cap="none" normalizeH="0" baseline="0" dirty="0" err="1" smtClean="0">
+              <a:rPr kumimoji="0" lang="de-DE" altLang="de-DE" b="0" i="0" u="none" strike="noStrike" cap="none" normalizeH="0" baseline="0" dirty="0" err="1">
                 <a:ln>
                   <a:noFill/>
                 </a:ln>
@@ -5772,7 +5739,7 @@
               <a:t>aws_instance</a:t>
             </a:r>
             <a:r>
-              <a:rPr kumimoji="0" lang="de-DE" altLang="de-DE" b="0" i="0" u="none" strike="noStrike" cap="none" normalizeH="0" baseline="0" dirty="0" smtClean="0">
+              <a:rPr kumimoji="0" lang="de-DE" altLang="de-DE" b="0" i="0" u="none" strike="noStrike" cap="none" normalizeH="0" baseline="0" dirty="0">
                 <a:ln>
                   <a:noFill/>
                 </a:ln>
@@ -5785,7 +5752,7 @@
               <a:t>",</a:t>
             </a:r>
             <a:br>
-              <a:rPr kumimoji="0" lang="de-DE" altLang="de-DE" b="0" i="0" u="none" strike="noStrike" cap="none" normalizeH="0" baseline="0" dirty="0" smtClean="0">
+              <a:rPr kumimoji="0" lang="de-DE" altLang="de-DE" b="0" i="0" u="none" strike="noStrike" cap="none" normalizeH="0" baseline="0" dirty="0">
                 <a:ln>
                   <a:noFill/>
                 </a:ln>
@@ -5797,7 +5764,7 @@
               </a:rPr>
             </a:br>
             <a:r>
-              <a:rPr kumimoji="0" lang="de-DE" altLang="de-DE" b="0" i="0" u="none" strike="noStrike" cap="none" normalizeH="0" baseline="0" dirty="0" smtClean="0">
+              <a:rPr kumimoji="0" lang="de-DE" altLang="de-DE" b="0" i="0" u="none" strike="noStrike" cap="none" normalizeH="0" baseline="0" dirty="0">
                 <a:ln>
                   <a:noFill/>
                 </a:ln>
@@ -5810,7 +5777,7 @@
               <a:t>      "</a:t>
             </a:r>
             <a:r>
-              <a:rPr kumimoji="0" lang="de-DE" altLang="de-DE" b="0" i="0" u="none" strike="noStrike" cap="none" normalizeH="0" baseline="0" dirty="0" err="1" smtClean="0">
+              <a:rPr kumimoji="0" lang="de-DE" altLang="de-DE" b="0" i="0" u="none" strike="noStrike" cap="none" normalizeH="0" baseline="0" dirty="0" err="1">
                 <a:ln>
                   <a:noFill/>
                 </a:ln>
@@ -5823,7 +5790,7 @@
               <a:t>name</a:t>
             </a:r>
             <a:r>
-              <a:rPr kumimoji="0" lang="de-DE" altLang="de-DE" b="0" i="0" u="none" strike="noStrike" cap="none" normalizeH="0" baseline="0" dirty="0" smtClean="0">
+              <a:rPr kumimoji="0" lang="de-DE" altLang="de-DE" b="0" i="0" u="none" strike="noStrike" cap="none" normalizeH="0" baseline="0" dirty="0">
                 <a:ln>
                   <a:noFill/>
                 </a:ln>
@@ -5836,7 +5803,7 @@
               <a:t>": "</a:t>
             </a:r>
             <a:r>
-              <a:rPr kumimoji="0" lang="de-DE" altLang="de-DE" b="0" i="0" u="none" strike="noStrike" cap="none" normalizeH="0" baseline="0" dirty="0" err="1" smtClean="0">
+              <a:rPr kumimoji="0" lang="de-DE" altLang="de-DE" b="0" i="0" u="none" strike="noStrike" cap="none" normalizeH="0" baseline="0" dirty="0" err="1">
                 <a:ln>
                   <a:noFill/>
                 </a:ln>
@@ -5849,7 +5816,7 @@
               <a:t>tf_training</a:t>
             </a:r>
             <a:r>
-              <a:rPr kumimoji="0" lang="de-DE" altLang="de-DE" b="0" i="0" u="none" strike="noStrike" cap="none" normalizeH="0" baseline="0" dirty="0" smtClean="0">
+              <a:rPr kumimoji="0" lang="de-DE" altLang="de-DE" b="0" i="0" u="none" strike="noStrike" cap="none" normalizeH="0" baseline="0" dirty="0">
                 <a:ln>
                   <a:noFill/>
                 </a:ln>
@@ -5861,7 +5828,7 @@
               </a:rPr>
               <a:t>",</a:t>
             </a:r>
-            <a:endParaRPr kumimoji="0" lang="de-DE" altLang="de-DE" sz="4000" b="0" i="0" u="none" strike="noStrike" cap="none" normalizeH="0" baseline="0" dirty="0" smtClean="0">
+            <a:endParaRPr kumimoji="0" lang="de-DE" altLang="de-DE" sz="4000" b="0" i="0" u="none" strike="noStrike" cap="none" normalizeH="0" baseline="0" dirty="0">
               <a:ln>
                 <a:noFill/>
               </a:ln>
@@ -5920,10 +5887,9 @@
           <a:lstStyle/>
           <a:p>
             <a:r>
-              <a:rPr lang="de-DE" dirty="0" smtClean="0"/>
+              <a:rPr lang="de-DE" dirty="0"/>
               <a:t>Terraform Workflow</a:t>
             </a:r>
-            <a:endParaRPr lang="de-DE" dirty="0"/>
           </a:p>
         </p:txBody>
       </p:sp>
@@ -6003,23 +5969,15 @@
           <a:p>
             <a:r>
               <a:rPr lang="de-DE" dirty="0" err="1"/>
-              <a:t>t</a:t>
-            </a:r>
-            <a:r>
-              <a:rPr lang="de-DE" dirty="0" err="1" smtClean="0"/>
-              <a:t>erraform</a:t>
-            </a:r>
-            <a:r>
-              <a:rPr lang="de-DE" dirty="0" smtClean="0"/>
+              <a:t>terraform</a:t>
+            </a:r>
+            <a:r>
+              <a:rPr lang="de-DE" dirty="0"/>
               <a:t> </a:t>
             </a:r>
             <a:r>
               <a:rPr lang="de-DE" dirty="0" err="1"/>
-              <a:t>i</a:t>
-            </a:r>
-            <a:r>
-              <a:rPr lang="de-DE" dirty="0" err="1" smtClean="0"/>
-              <a:t>nit</a:t>
+              <a:t>init</a:t>
             </a:r>
             <a:endParaRPr lang="de-DE" dirty="0"/>
           </a:p>
@@ -6041,32 +5999,31 @@
           <a:lstStyle/>
           <a:p>
             <a:r>
-              <a:rPr lang="de-DE" dirty="0" smtClean="0"/>
+              <a:rPr lang="de-DE" dirty="0"/>
               <a:t>Initialisieren des Arbeitsverzeichnis </a:t>
             </a:r>
           </a:p>
           <a:p>
             <a:pPr lvl="1"/>
             <a:r>
-              <a:rPr lang="de-DE" dirty="0" smtClean="0"/>
+              <a:rPr lang="de-DE" dirty="0"/>
               <a:t>Holen oder erstellen des State-Files aus dem konfiguriertem Backend</a:t>
             </a:r>
           </a:p>
           <a:p>
             <a:pPr lvl="1"/>
             <a:r>
-              <a:rPr lang="de-DE" dirty="0" smtClean="0"/>
+              <a:rPr lang="de-DE" dirty="0"/>
               <a:t>Download und Installation von Provider </a:t>
             </a:r>
             <a:r>
-              <a:rPr lang="de-DE" dirty="0" err="1" smtClean="0"/>
+              <a:rPr lang="de-DE" dirty="0" err="1"/>
               <a:t>Plugins</a:t>
             </a:r>
             <a:r>
-              <a:rPr lang="de-DE" dirty="0" smtClean="0"/>
+              <a:rPr lang="de-DE" dirty="0"/>
               <a:t> und Modulen</a:t>
             </a:r>
-            <a:endParaRPr lang="de-DE" dirty="0"/>
           </a:p>
         </p:txBody>
       </p:sp>
@@ -6095,7 +6052,7 @@
           <a:lstStyle/>
           <a:p>
             <a:r>
-              <a:rPr lang="de-DE" sz="2000" dirty="0" smtClean="0">
+              <a:rPr lang="de-DE" sz="2000" dirty="0">
                 <a:solidFill>
                   <a:schemeClr val="bg1">
                     <a:lumMod val="85000"/>
@@ -6106,7 +6063,7 @@
               <a:t>C:\example &gt;</a:t>
             </a:r>
             <a:r>
-              <a:rPr lang="de-DE" sz="2000" dirty="0" err="1" smtClean="0">
+              <a:rPr lang="de-DE" sz="2000" dirty="0" err="1">
                 <a:solidFill>
                   <a:schemeClr val="bg1">
                     <a:lumMod val="85000"/>
@@ -6117,7 +6074,7 @@
               <a:t>terraform</a:t>
             </a:r>
             <a:r>
-              <a:rPr lang="de-DE" sz="2000" dirty="0" smtClean="0">
+              <a:rPr lang="de-DE" sz="2000" dirty="0">
                 <a:solidFill>
                   <a:schemeClr val="bg1">
                     <a:lumMod val="85000"/>
@@ -6772,17 +6729,12 @@
           <a:p>
             <a:r>
               <a:rPr lang="de-DE" dirty="0" err="1"/>
-              <a:t>t</a:t>
-            </a:r>
-            <a:r>
-              <a:rPr lang="de-DE" dirty="0" err="1" smtClean="0"/>
-              <a:t>erraform</a:t>
-            </a:r>
-            <a:r>
-              <a:rPr lang="de-DE" dirty="0" smtClean="0"/>
+              <a:t>terraform</a:t>
+            </a:r>
+            <a:r>
+              <a:rPr lang="de-DE" dirty="0"/>
               <a:t> plan</a:t>
             </a:r>
-            <a:endParaRPr lang="de-DE" dirty="0"/>
           </a:p>
         </p:txBody>
       </p:sp>
@@ -6802,39 +6754,38 @@
           <a:lstStyle/>
           <a:p>
             <a:r>
-              <a:rPr lang="de-DE" dirty="0" smtClean="0"/>
+              <a:rPr lang="de-DE" dirty="0"/>
               <a:t>Erstellen und Anzeigen eines Ausführungsplans</a:t>
             </a:r>
           </a:p>
           <a:p>
             <a:pPr lvl="1"/>
             <a:r>
-              <a:rPr lang="de-DE" dirty="0" smtClean="0"/>
+              <a:rPr lang="de-DE" dirty="0"/>
               <a:t>Lesen des aktuellen State der bereits existierenden Ressourcen</a:t>
             </a:r>
           </a:p>
           <a:p>
             <a:pPr lvl="1"/>
             <a:r>
-              <a:rPr lang="de-DE" dirty="0" smtClean="0"/>
+              <a:rPr lang="de-DE" dirty="0"/>
               <a:t>Vergleich der aktuellen Konfiguration mit dem State</a:t>
             </a:r>
           </a:p>
           <a:p>
             <a:pPr lvl="1"/>
             <a:r>
-              <a:rPr lang="de-DE" dirty="0" smtClean="0"/>
+              <a:rPr lang="de-DE" dirty="0"/>
               <a:t>Erstellen der Liste von </a:t>
             </a:r>
             <a:r>
-              <a:rPr lang="de-DE" dirty="0" err="1" smtClean="0"/>
+              <a:rPr lang="de-DE" dirty="0" err="1"/>
               <a:t>Changes</a:t>
             </a:r>
             <a:r>
-              <a:rPr lang="de-DE" dirty="0" smtClean="0"/>
+              <a:rPr lang="de-DE" dirty="0"/>
               <a:t> damit die Ressourcen der aktuellen Konfiguration entsprechen</a:t>
             </a:r>
-            <a:endParaRPr lang="de-DE" dirty="0"/>
           </a:p>
         </p:txBody>
       </p:sp>
@@ -6863,7 +6814,7 @@
           <a:lstStyle/>
           <a:p>
             <a:r>
-              <a:rPr lang="de-DE" sz="2000" dirty="0" smtClean="0">
+              <a:rPr lang="de-DE" sz="2000" dirty="0">
                 <a:solidFill>
                   <a:schemeClr val="bg1">
                     <a:lumMod val="85000"/>
@@ -6874,7 +6825,7 @@
               <a:t>C:\example &gt;</a:t>
             </a:r>
             <a:r>
-              <a:rPr lang="de-DE" sz="2000" dirty="0" err="1" smtClean="0">
+              <a:rPr lang="de-DE" sz="2000" dirty="0" err="1">
                 <a:solidFill>
                   <a:schemeClr val="bg1">
                     <a:lumMod val="85000"/>
@@ -6885,7 +6836,7 @@
               <a:t>terraform</a:t>
             </a:r>
             <a:r>
-              <a:rPr lang="de-DE" sz="2000" dirty="0" smtClean="0">
+              <a:rPr lang="de-DE" sz="2000" dirty="0">
                 <a:solidFill>
                   <a:schemeClr val="bg1">
                     <a:lumMod val="85000"/>
@@ -6894,6 +6845,113 @@
                 <a:latin typeface="Consolas" panose="020B0609020204030204" pitchFamily="49" charset="0"/>
               </a:rPr>
               <a:t> plan</a:t>
+            </a:r>
+          </a:p>
+          <a:p>
+            <a:r>
+              <a:rPr lang="de-DE" sz="2000" dirty="0">
+                <a:solidFill>
+                  <a:schemeClr val="bg1">
+                    <a:lumMod val="85000"/>
+                  </a:schemeClr>
+                </a:solidFill>
+                <a:latin typeface="Consolas" panose="020B0609020204030204" pitchFamily="49" charset="0"/>
+              </a:rPr>
+              <a:t>…</a:t>
+            </a:r>
+          </a:p>
+          <a:p>
+            <a:r>
+              <a:rPr lang="en-US" sz="2000" dirty="0">
+                <a:solidFill>
+                  <a:schemeClr val="bg1">
+                    <a:lumMod val="85000"/>
+                  </a:schemeClr>
+                </a:solidFill>
+                <a:latin typeface="Consolas" panose="020B0609020204030204" pitchFamily="49" charset="0"/>
+              </a:rPr>
+              <a:t>Terraform used the selected providers to generate the following execution plan. Resource actions are indicated with the following symbols:</a:t>
+            </a:r>
+          </a:p>
+          <a:p>
+            <a:r>
+              <a:rPr lang="en-US" sz="2000" dirty="0">
+                <a:solidFill>
+                  <a:schemeClr val="bg1">
+                    <a:lumMod val="85000"/>
+                  </a:schemeClr>
+                </a:solidFill>
+                <a:latin typeface="Consolas" panose="020B0609020204030204" pitchFamily="49" charset="0"/>
+              </a:rPr>
+              <a:t>  </a:t>
+            </a:r>
+            <a:r>
+              <a:rPr lang="en-US" sz="2000" dirty="0">
+                <a:solidFill>
+                  <a:schemeClr val="accent6">
+                    <a:lumMod val="60000"/>
+                    <a:lumOff val="40000"/>
+                  </a:schemeClr>
+                </a:solidFill>
+                <a:latin typeface="Consolas" panose="020B0609020204030204" pitchFamily="49" charset="0"/>
+              </a:rPr>
+              <a:t>~</a:t>
+            </a:r>
+            <a:r>
+              <a:rPr lang="en-US" sz="2000" dirty="0">
+                <a:solidFill>
+                  <a:schemeClr val="bg1">
+                    <a:lumMod val="85000"/>
+                  </a:schemeClr>
+                </a:solidFill>
+                <a:latin typeface="Consolas" panose="020B0609020204030204" pitchFamily="49" charset="0"/>
+              </a:rPr>
+              <a:t> update in-place</a:t>
+            </a:r>
+          </a:p>
+          <a:p>
+            <a:r>
+              <a:rPr lang="en-US" sz="2000" dirty="0">
+                <a:solidFill>
+                  <a:srgbClr val="FF0000"/>
+                </a:solidFill>
+                <a:latin typeface="Consolas" panose="020B0609020204030204" pitchFamily="49" charset="0"/>
+              </a:rPr>
+              <a:t>-</a:t>
+            </a:r>
+            <a:r>
+              <a:rPr lang="en-US" sz="2000" dirty="0">
+                <a:solidFill>
+                  <a:schemeClr val="bg1">
+                    <a:lumMod val="85000"/>
+                  </a:schemeClr>
+                </a:solidFill>
+                <a:latin typeface="Consolas" panose="020B0609020204030204" pitchFamily="49" charset="0"/>
+              </a:rPr>
+              <a:t>/</a:t>
+            </a:r>
+            <a:r>
+              <a:rPr lang="en-US" sz="2000" dirty="0">
+                <a:solidFill>
+                  <a:schemeClr val="accent6">
+                    <a:lumMod val="60000"/>
+                    <a:lumOff val="40000"/>
+                  </a:schemeClr>
+                </a:solidFill>
+                <a:latin typeface="Consolas" panose="020B0609020204030204" pitchFamily="49" charset="0"/>
+              </a:rPr>
+              <a:t>+</a:t>
+            </a:r>
+            <a:r>
+              <a:rPr lang="en-US" sz="2000" dirty="0">
+                <a:solidFill>
+                  <a:schemeClr val="bg1">
+                    <a:lumMod val="85000"/>
+                  </a:schemeClr>
+                </a:solidFill>
+                <a:latin typeface="Consolas" panose="020B0609020204030204" pitchFamily="49" charset="0"/>
+              </a:rPr>
+              <a:t> destroy and then create replacement</a:t>
             </a:r>
             <a:endParaRPr lang="de-DE" sz="2000" dirty="0">
               <a:solidFill>
@@ -6906,7 +6964,7 @@
           </a:p>
           <a:p>
             <a:r>
-              <a:rPr lang="de-DE" sz="2000" dirty="0" smtClean="0">
+              <a:rPr lang="en-US" sz="2000" dirty="0">
                 <a:solidFill>
                   <a:schemeClr val="bg1">
                     <a:lumMod val="85000"/>
@@ -6927,186 +6985,8 @@
                 </a:solidFill>
                 <a:latin typeface="Consolas" panose="020B0609020204030204" pitchFamily="49" charset="0"/>
               </a:rPr>
-              <a:t>Terraform used the selected providers to generate the following execution plan. Resource actions are indicated </a:t>
-            </a:r>
-            <a:r>
-              <a:rPr lang="en-US" sz="2000" dirty="0" smtClean="0">
-                <a:solidFill>
-                  <a:schemeClr val="bg1">
-                    <a:lumMod val="85000"/>
-                  </a:schemeClr>
-                </a:solidFill>
-                <a:latin typeface="Consolas" panose="020B0609020204030204" pitchFamily="49" charset="0"/>
-              </a:rPr>
-              <a:t>with the </a:t>
-            </a:r>
-            <a:r>
-              <a:rPr lang="en-US" sz="2000" dirty="0">
-                <a:solidFill>
-                  <a:schemeClr val="bg1">
-                    <a:lumMod val="85000"/>
-                  </a:schemeClr>
-                </a:solidFill>
-                <a:latin typeface="Consolas" panose="020B0609020204030204" pitchFamily="49" charset="0"/>
-              </a:rPr>
-              <a:t>following symbols:</a:t>
-            </a:r>
-          </a:p>
-          <a:p>
-            <a:r>
-              <a:rPr lang="en-US" sz="2000" dirty="0">
-                <a:solidFill>
-                  <a:schemeClr val="bg1">
-                    <a:lumMod val="85000"/>
-                  </a:schemeClr>
-                </a:solidFill>
-                <a:latin typeface="Consolas" panose="020B0609020204030204" pitchFamily="49" charset="0"/>
-              </a:rPr>
-              <a:t>  </a:t>
-            </a:r>
-            <a:r>
-              <a:rPr lang="en-US" sz="2000" dirty="0">
-                <a:solidFill>
-                  <a:schemeClr val="accent6">
-                    <a:lumMod val="60000"/>
-                    <a:lumOff val="40000"/>
-                  </a:schemeClr>
-                </a:solidFill>
-                <a:latin typeface="Consolas" panose="020B0609020204030204" pitchFamily="49" charset="0"/>
-              </a:rPr>
-              <a:t>~</a:t>
-            </a:r>
-            <a:r>
-              <a:rPr lang="en-US" sz="2000" dirty="0">
-                <a:solidFill>
-                  <a:schemeClr val="bg1">
-                    <a:lumMod val="85000"/>
-                  </a:schemeClr>
-                </a:solidFill>
-                <a:latin typeface="Consolas" panose="020B0609020204030204" pitchFamily="49" charset="0"/>
-              </a:rPr>
-              <a:t> update in-place</a:t>
-            </a:r>
-          </a:p>
-          <a:p>
-            <a:r>
-              <a:rPr lang="en-US" sz="2000" dirty="0">
-                <a:solidFill>
-                  <a:srgbClr val="FF0000"/>
-                </a:solidFill>
-                <a:latin typeface="Consolas" panose="020B0609020204030204" pitchFamily="49" charset="0"/>
-              </a:rPr>
-              <a:t>-</a:t>
-            </a:r>
-            <a:r>
-              <a:rPr lang="en-US" sz="2000" dirty="0">
-                <a:solidFill>
-                  <a:schemeClr val="bg1">
-                    <a:lumMod val="85000"/>
-                  </a:schemeClr>
-                </a:solidFill>
-                <a:latin typeface="Consolas" panose="020B0609020204030204" pitchFamily="49" charset="0"/>
-              </a:rPr>
-              <a:t>/</a:t>
-            </a:r>
-            <a:r>
-              <a:rPr lang="en-US" sz="2000" dirty="0">
-                <a:solidFill>
-                  <a:schemeClr val="accent6">
-                    <a:lumMod val="60000"/>
-                    <a:lumOff val="40000"/>
-                  </a:schemeClr>
-                </a:solidFill>
-                <a:latin typeface="Consolas" panose="020B0609020204030204" pitchFamily="49" charset="0"/>
-              </a:rPr>
-              <a:t>+</a:t>
-            </a:r>
-            <a:r>
-              <a:rPr lang="en-US" sz="2000" dirty="0">
-                <a:solidFill>
-                  <a:schemeClr val="bg1">
-                    <a:lumMod val="85000"/>
-                  </a:schemeClr>
-                </a:solidFill>
-                <a:latin typeface="Consolas" panose="020B0609020204030204" pitchFamily="49" charset="0"/>
-              </a:rPr>
-              <a:t> destroy and then create </a:t>
-            </a:r>
-            <a:r>
-              <a:rPr lang="en-US" sz="2000" dirty="0" smtClean="0">
-                <a:solidFill>
-                  <a:schemeClr val="bg1">
-                    <a:lumMod val="85000"/>
-                  </a:schemeClr>
-                </a:solidFill>
-                <a:latin typeface="Consolas" panose="020B0609020204030204" pitchFamily="49" charset="0"/>
-              </a:rPr>
-              <a:t>replacement</a:t>
-            </a:r>
-            <a:endParaRPr lang="de-DE" sz="2000" dirty="0">
-              <a:solidFill>
-                <a:schemeClr val="bg1">
-                  <a:lumMod val="85000"/>
-                </a:schemeClr>
-              </a:solidFill>
-              <a:latin typeface="Consolas" panose="020B0609020204030204" pitchFamily="49" charset="0"/>
-            </a:endParaRPr>
-          </a:p>
-          <a:p>
-            <a:r>
-              <a:rPr lang="en-US" sz="2000" dirty="0" smtClean="0">
-                <a:solidFill>
-                  <a:schemeClr val="bg1">
-                    <a:lumMod val="85000"/>
-                  </a:schemeClr>
-                </a:solidFill>
-                <a:latin typeface="Consolas" panose="020B0609020204030204" pitchFamily="49" charset="0"/>
-              </a:rPr>
-              <a:t>…</a:t>
-            </a:r>
-          </a:p>
-          <a:p>
-            <a:r>
-              <a:rPr lang="en-US" sz="2000" dirty="0" smtClean="0">
-                <a:solidFill>
-                  <a:schemeClr val="bg1">
-                    <a:lumMod val="85000"/>
-                  </a:schemeClr>
-                </a:solidFill>
-                <a:latin typeface="Consolas" panose="020B0609020204030204" pitchFamily="49" charset="0"/>
-              </a:rPr>
-              <a:t>Plan</a:t>
-            </a:r>
-            <a:r>
-              <a:rPr lang="en-US" sz="2000" dirty="0">
-                <a:solidFill>
-                  <a:schemeClr val="bg1">
-                    <a:lumMod val="85000"/>
-                  </a:schemeClr>
-                </a:solidFill>
-                <a:latin typeface="Consolas" panose="020B0609020204030204" pitchFamily="49" charset="0"/>
-              </a:rPr>
-              <a:t>: 1 to add, 1 to change, 1 to destroy</a:t>
-            </a:r>
-            <a:r>
-              <a:rPr lang="en-US" sz="2000" dirty="0" smtClean="0">
-                <a:solidFill>
-                  <a:schemeClr val="bg1">
-                    <a:lumMod val="85000"/>
-                  </a:schemeClr>
-                </a:solidFill>
-                <a:latin typeface="Consolas" panose="020B0609020204030204" pitchFamily="49" charset="0"/>
-              </a:rPr>
-              <a:t>.</a:t>
-            </a:r>
-            <a:endParaRPr lang="en-US" sz="2000" dirty="0">
-              <a:solidFill>
-                <a:schemeClr val="bg1">
-                  <a:lumMod val="85000"/>
-                </a:schemeClr>
-              </a:solidFill>
-              <a:latin typeface="Consolas" panose="020B0609020204030204" pitchFamily="49" charset="0"/>
-            </a:endParaRPr>
+              <a:t>Plan: 1 to add, 1 to change, 1 to destroy.</a:t>
+            </a:r>
           </a:p>
         </p:txBody>
       </p:sp>
@@ -7157,18 +7037,14 @@
           <a:p>
             <a:r>
               <a:rPr lang="de-DE" dirty="0" err="1"/>
-              <a:t>t</a:t>
-            </a:r>
-            <a:r>
-              <a:rPr lang="de-DE" dirty="0" err="1" smtClean="0"/>
-              <a:t>erraform</a:t>
-            </a:r>
-            <a:r>
-              <a:rPr lang="de-DE" dirty="0" smtClean="0"/>
+              <a:t>terraform</a:t>
+            </a:r>
+            <a:r>
+              <a:rPr lang="de-DE" dirty="0"/>
               <a:t> </a:t>
             </a:r>
             <a:r>
-              <a:rPr lang="de-DE" dirty="0" err="1" smtClean="0"/>
+              <a:rPr lang="de-DE" dirty="0" err="1"/>
               <a:t>apply</a:t>
             </a:r>
             <a:endParaRPr lang="de-DE" dirty="0"/>
@@ -7191,58 +7067,57 @@
           <a:lstStyle/>
           <a:p>
             <a:r>
-              <a:rPr lang="de-DE" dirty="0" smtClean="0"/>
+              <a:rPr lang="de-DE" dirty="0"/>
               <a:t>Anwenden der aktuellen Konfiguration</a:t>
             </a:r>
           </a:p>
           <a:p>
             <a:r>
-              <a:rPr lang="de-DE" dirty="0" smtClean="0"/>
+              <a:rPr lang="de-DE" dirty="0"/>
               <a:t>Im Vorfeld wird ein </a:t>
             </a:r>
             <a:r>
-              <a:rPr lang="de-DE" i="1" dirty="0" err="1" smtClean="0"/>
+              <a:rPr lang="de-DE" i="1" dirty="0" err="1"/>
               <a:t>terraform</a:t>
             </a:r>
             <a:r>
-              <a:rPr lang="de-DE" i="1" dirty="0" smtClean="0"/>
+              <a:rPr lang="de-DE" i="1" dirty="0"/>
               <a:t> plan </a:t>
             </a:r>
             <a:r>
-              <a:rPr lang="de-DE" dirty="0" smtClean="0"/>
+              <a:rPr lang="de-DE" dirty="0"/>
               <a:t>ausgeführt</a:t>
             </a:r>
           </a:p>
           <a:p>
             <a:pPr lvl="1"/>
             <a:r>
-              <a:rPr lang="de-DE" dirty="0" smtClean="0"/>
+              <a:rPr lang="de-DE" dirty="0"/>
               <a:t>Bestätigung des Plan über die CLI</a:t>
             </a:r>
           </a:p>
           <a:p>
             <a:pPr lvl="1"/>
             <a:r>
-              <a:rPr lang="de-DE" dirty="0" smtClean="0"/>
+              <a:rPr lang="de-DE" dirty="0"/>
               <a:t>Option </a:t>
             </a:r>
             <a:r>
-              <a:rPr lang="de-DE" i="1" dirty="0" smtClean="0"/>
+              <a:rPr lang="de-DE" i="1" dirty="0"/>
               <a:t>–auto-</a:t>
             </a:r>
             <a:r>
-              <a:rPr lang="de-DE" i="1" dirty="0" err="1" smtClean="0"/>
+              <a:rPr lang="de-DE" i="1" dirty="0" err="1"/>
               <a:t>approve</a:t>
             </a:r>
             <a:r>
-              <a:rPr lang="de-DE" i="1" dirty="0" smtClean="0"/>
+              <a:rPr lang="de-DE" i="1" dirty="0"/>
               <a:t> </a:t>
             </a:r>
             <a:r>
-              <a:rPr lang="de-DE" dirty="0" smtClean="0"/>
+              <a:rPr lang="de-DE" dirty="0"/>
               <a:t>für Einsatz von Automatisierung</a:t>
             </a:r>
-            <a:endParaRPr lang="de-DE" dirty="0"/>
           </a:p>
         </p:txBody>
       </p:sp>
@@ -7271,7 +7146,7 @@
           <a:lstStyle/>
           <a:p>
             <a:r>
-              <a:rPr lang="de-DE" sz="2000" dirty="0" smtClean="0">
+              <a:rPr lang="de-DE" sz="2000" dirty="0">
                 <a:solidFill>
                   <a:schemeClr val="bg1">
                     <a:lumMod val="85000"/>
@@ -7282,7 +7157,7 @@
               <a:t>C:\example &gt;</a:t>
             </a:r>
             <a:r>
-              <a:rPr lang="de-DE" sz="2000" dirty="0" err="1" smtClean="0">
+              <a:rPr lang="de-DE" sz="2000" dirty="0" err="1">
                 <a:solidFill>
                   <a:schemeClr val="bg1">
                     <a:lumMod val="85000"/>
@@ -7293,7 +7168,7 @@
               <a:t>terraform</a:t>
             </a:r>
             <a:r>
-              <a:rPr lang="de-DE" sz="2000" dirty="0" smtClean="0">
+              <a:rPr lang="de-DE" sz="2000" dirty="0">
                 <a:solidFill>
                   <a:schemeClr val="bg1">
                     <a:lumMod val="85000"/>
@@ -7304,7 +7179,7 @@
               <a:t> </a:t>
             </a:r>
             <a:r>
-              <a:rPr lang="de-DE" sz="2000" dirty="0" err="1" smtClean="0">
+              <a:rPr lang="de-DE" sz="2000" dirty="0" err="1">
                 <a:solidFill>
                   <a:schemeClr val="bg1">
                     <a:lumMod val="85000"/>
@@ -7325,7 +7200,7 @@
           </a:p>
           <a:p>
             <a:r>
-              <a:rPr lang="de-DE" sz="2000" dirty="0" smtClean="0">
+              <a:rPr lang="de-DE" sz="2000" dirty="0">
                 <a:solidFill>
                   <a:schemeClr val="bg1">
                     <a:lumMod val="85000"/>
@@ -7338,17 +7213,6 @@
           </a:p>
           <a:p>
             <a:r>
-              <a:rPr lang="en-US" sz="2000" dirty="0" smtClean="0">
-                <a:solidFill>
-                  <a:schemeClr val="bg1">
-                    <a:lumMod val="85000"/>
-                  </a:schemeClr>
-                </a:solidFill>
-                <a:latin typeface="Consolas" panose="020B0609020204030204" pitchFamily="49" charset="0"/>
-              </a:rPr>
-              <a:t>Plan</a:t>
-            </a:r>
-            <a:r>
               <a:rPr lang="en-US" sz="2000" dirty="0">
                 <a:solidFill>
                   <a:schemeClr val="bg1">
@@ -7357,18 +7221,7 @@
                 </a:solidFill>
                 <a:latin typeface="Consolas" panose="020B0609020204030204" pitchFamily="49" charset="0"/>
               </a:rPr>
-              <a:t>: 1 to add, 1 to change, 1 to destroy</a:t>
-            </a:r>
-            <a:r>
-              <a:rPr lang="en-US" sz="2000" dirty="0" smtClean="0">
-                <a:solidFill>
-                  <a:schemeClr val="bg1">
-                    <a:lumMod val="85000"/>
-                  </a:schemeClr>
-                </a:solidFill>
-                <a:latin typeface="Consolas" panose="020B0609020204030204" pitchFamily="49" charset="0"/>
-              </a:rPr>
-              <a:t>.</a:t>
+              <a:t>Plan: 1 to add, 1 to change, 1 to destroy.</a:t>
             </a:r>
           </a:p>
           <a:p>
@@ -7386,7 +7239,7 @@
           </a:p>
           <a:p>
             <a:r>
-              <a:rPr lang="en-US" sz="2000" dirty="0" smtClean="0">
+              <a:rPr lang="en-US" sz="2000" dirty="0">
                 <a:solidFill>
                   <a:schemeClr val="bg1">
                     <a:lumMod val="85000"/>
@@ -7399,7 +7252,7 @@
           </a:p>
           <a:p>
             <a:r>
-              <a:rPr lang="en-US" sz="2000" dirty="0" smtClean="0">
+              <a:rPr lang="en-US" sz="2000" dirty="0">
                 <a:solidFill>
                   <a:schemeClr val="bg1">
                     <a:lumMod val="85000"/>
@@ -7454,27 +7307,8 @@
                 </a:solidFill>
                 <a:latin typeface="Consolas" panose="020B0609020204030204" pitchFamily="49" charset="0"/>
               </a:rPr>
-              <a:t>Apply complete! Resources: 1 added, 1 changed, 1 destroyed</a:t>
-            </a:r>
-            <a:r>
-              <a:rPr lang="en-US" sz="2000" dirty="0" smtClean="0">
-                <a:solidFill>
-                  <a:schemeClr val="accent6">
-                    <a:lumMod val="75000"/>
-                  </a:schemeClr>
-                </a:solidFill>
-                <a:latin typeface="Consolas" panose="020B0609020204030204" pitchFamily="49" charset="0"/>
-              </a:rPr>
-              <a:t>.</a:t>
-            </a:r>
-            <a:endParaRPr lang="en-US" sz="2000" dirty="0">
-              <a:solidFill>
-                <a:schemeClr val="accent6">
-                  <a:lumMod val="75000"/>
-                </a:schemeClr>
-              </a:solidFill>
-              <a:latin typeface="Consolas" panose="020B0609020204030204" pitchFamily="49" charset="0"/>
-            </a:endParaRPr>
+              <a:t>Apply complete! Resources: 1 added, 1 changed, 1 destroyed.</a:t>
+            </a:r>
           </a:p>
         </p:txBody>
       </p:sp>
@@ -7525,94 +7359,82 @@
           <a:p>
             <a:r>
               <a:rPr lang="de-DE" dirty="0" err="1"/>
-              <a:t>t</a:t>
-            </a:r>
-            <a:r>
-              <a:rPr lang="de-DE" dirty="0" err="1" smtClean="0"/>
-              <a:t>erraform</a:t>
-            </a:r>
-            <a:r>
-              <a:rPr lang="de-DE" dirty="0" smtClean="0"/>
+              <a:t>terraform</a:t>
+            </a:r>
+            <a:r>
+              <a:rPr lang="de-DE" dirty="0"/>
               <a:t> </a:t>
             </a:r>
             <a:r>
-              <a:rPr lang="de-DE" dirty="0" err="1" smtClean="0"/>
+              <a:rPr lang="de-DE" dirty="0" err="1"/>
               <a:t>apply</a:t>
             </a:r>
             <a:r>
-              <a:rPr lang="de-DE" dirty="0" smtClean="0"/>
+              <a:rPr lang="de-DE" dirty="0"/>
               <a:t> –</a:t>
             </a:r>
             <a:r>
-              <a:rPr lang="de-DE" dirty="0" err="1" smtClean="0"/>
+              <a:rPr lang="de-DE" dirty="0" err="1"/>
+              <a:t>refresh-only</a:t>
+            </a:r>
+            <a:endParaRPr lang="de-DE" dirty="0"/>
+          </a:p>
+        </p:txBody>
+      </p:sp>
+      <p:sp>
+        <p:nvSpPr>
+          <p:cNvPr id="3" name="Inhaltsplatzhalter 2"/>
+          <p:cNvSpPr>
+            <a:spLocks noGrp="1"/>
+          </p:cNvSpPr>
+          <p:nvPr>
+            <p:ph idx="1"/>
+          </p:nvPr>
+        </p:nvSpPr>
+        <p:spPr/>
+        <p:txBody>
+          <a:bodyPr/>
+          <a:lstStyle/>
+          <a:p>
+            <a:r>
+              <a:rPr lang="de-DE" dirty="0"/>
+              <a:t>Abgleich des State mit den realen Ressourcen</a:t>
+            </a:r>
+          </a:p>
+          <a:p>
+            <a:r>
+              <a:rPr lang="de-DE" dirty="0"/>
+              <a:t>Ersetzt den Befehl </a:t>
+            </a:r>
+            <a:r>
+              <a:rPr lang="de-DE" i="1" dirty="0" err="1"/>
+              <a:t>terraform</a:t>
+            </a:r>
+            <a:r>
+              <a:rPr lang="de-DE" i="1" dirty="0"/>
+              <a:t> </a:t>
+            </a:r>
+            <a:r>
+              <a:rPr lang="de-DE" i="1" dirty="0" err="1"/>
               <a:t>refresh</a:t>
             </a:r>
             <a:r>
+              <a:rPr lang="de-DE" dirty="0"/>
+              <a:t> </a:t>
+            </a:r>
+          </a:p>
+          <a:p>
+            <a:pPr lvl="1"/>
+            <a:r>
+              <a:rPr lang="de-DE" dirty="0"/>
+              <a:t>(seit v0.15.4 </a:t>
+            </a:r>
+            <a:r>
               <a:rPr lang="de-DE" dirty="0" err="1"/>
-              <a:t>-</a:t>
-            </a:r>
-            <a:r>
-              <a:rPr lang="de-DE" dirty="0" err="1" smtClean="0"/>
-              <a:t>only</a:t>
-            </a:r>
-            <a:endParaRPr lang="de-DE" dirty="0"/>
-          </a:p>
-        </p:txBody>
-      </p:sp>
-      <p:sp>
-        <p:nvSpPr>
-          <p:cNvPr id="3" name="Inhaltsplatzhalter 2"/>
-          <p:cNvSpPr>
-            <a:spLocks noGrp="1"/>
-          </p:cNvSpPr>
-          <p:nvPr>
-            <p:ph idx="1"/>
-          </p:nvPr>
-        </p:nvSpPr>
-        <p:spPr/>
-        <p:txBody>
-          <a:bodyPr/>
-          <a:lstStyle/>
-          <a:p>
-            <a:r>
-              <a:rPr lang="de-DE" dirty="0" smtClean="0"/>
-              <a:t>Abgleich des State mit den realen Ressourcen</a:t>
-            </a:r>
-          </a:p>
-          <a:p>
-            <a:r>
-              <a:rPr lang="de-DE" dirty="0" smtClean="0"/>
-              <a:t>Ersetzt den Befehl </a:t>
-            </a:r>
-            <a:r>
-              <a:rPr lang="de-DE" i="1" dirty="0" err="1" smtClean="0"/>
-              <a:t>terraform</a:t>
-            </a:r>
-            <a:r>
-              <a:rPr lang="de-DE" i="1" dirty="0" smtClean="0"/>
-              <a:t> </a:t>
-            </a:r>
-            <a:r>
-              <a:rPr lang="de-DE" i="1" dirty="0" err="1" smtClean="0"/>
-              <a:t>refresh</a:t>
-            </a:r>
-            <a:r>
-              <a:rPr lang="de-DE" dirty="0" smtClean="0"/>
-              <a:t> </a:t>
-            </a:r>
-          </a:p>
-          <a:p>
-            <a:pPr lvl="1"/>
-            <a:r>
-              <a:rPr lang="de-DE" dirty="0" smtClean="0"/>
-              <a:t>(seit v0.15.4 </a:t>
-            </a:r>
-            <a:r>
-              <a:rPr lang="de-DE" dirty="0" err="1" smtClean="0"/>
               <a:t>deprecated</a:t>
             </a:r>
             <a:r>
-              <a:rPr lang="de-DE" dirty="0" smtClean="0"/>
+              <a:rPr lang="de-DE" dirty="0"/>
               <a:t>)</a:t>
             </a:r>
           </a:p>
@@ -7643,7 +7465,7 @@
           <a:lstStyle/>
           <a:p>
             <a:r>
-              <a:rPr lang="de-DE" sz="2000" dirty="0" smtClean="0">
+              <a:rPr lang="de-DE" sz="2000" dirty="0">
                 <a:solidFill>
                   <a:schemeClr val="bg1">
                     <a:lumMod val="85000"/>
@@ -7654,7 +7476,7 @@
               <a:t>C:\example &gt;</a:t>
             </a:r>
             <a:r>
-              <a:rPr lang="de-DE" sz="2000" dirty="0" err="1" smtClean="0">
+              <a:rPr lang="de-DE" sz="2000" dirty="0" err="1">
                 <a:solidFill>
                   <a:schemeClr val="bg1">
                     <a:lumMod val="85000"/>
@@ -7665,7 +7487,7 @@
               <a:t>terraform</a:t>
             </a:r>
             <a:r>
-              <a:rPr lang="de-DE" sz="2000" dirty="0" smtClean="0">
+              <a:rPr lang="de-DE" sz="2000" dirty="0">
                 <a:solidFill>
                   <a:schemeClr val="bg1">
                     <a:lumMod val="85000"/>
@@ -7676,7 +7498,7 @@
               <a:t> </a:t>
             </a:r>
             <a:r>
-              <a:rPr lang="de-DE" sz="2000" dirty="0" err="1" smtClean="0">
+              <a:rPr lang="de-DE" sz="2000" dirty="0" err="1">
                 <a:solidFill>
                   <a:schemeClr val="bg1">
                     <a:lumMod val="85000"/>
@@ -7687,7 +7509,7 @@
               <a:t>apply</a:t>
             </a:r>
             <a:r>
-              <a:rPr lang="de-DE" sz="2000" dirty="0" smtClean="0">
+              <a:rPr lang="de-DE" sz="2000" dirty="0">
                 <a:solidFill>
                   <a:schemeClr val="bg1">
                     <a:lumMod val="85000"/>
@@ -7698,7 +7520,7 @@
               <a:t> –</a:t>
             </a:r>
             <a:r>
-              <a:rPr lang="de-DE" sz="2000" dirty="0" err="1" smtClean="0">
+              <a:rPr lang="de-DE" sz="2000" dirty="0" err="1">
                 <a:solidFill>
                   <a:schemeClr val="bg1">
                     <a:lumMod val="85000"/>
@@ -7708,7 +7530,7 @@
               </a:rPr>
               <a:t>refresh-only</a:t>
             </a:r>
-            <a:endParaRPr lang="de-DE" sz="2000" dirty="0" smtClean="0">
+            <a:endParaRPr lang="de-DE" sz="2000" dirty="0">
               <a:solidFill>
                 <a:schemeClr val="bg1">
                   <a:lumMod val="85000"/>
@@ -7743,7 +7565,7 @@
           </a:p>
           <a:p>
             <a:r>
-              <a:rPr lang="en-US" sz="2000" dirty="0" smtClean="0">
+              <a:rPr lang="en-US" sz="2000" dirty="0">
                 <a:solidFill>
                   <a:schemeClr val="bg1">
                     <a:lumMod val="85000"/>
@@ -7756,17 +7578,6 @@
           </a:p>
           <a:p>
             <a:r>
-              <a:rPr lang="en-US" sz="2000" dirty="0" smtClean="0">
-                <a:solidFill>
-                  <a:schemeClr val="bg1">
-                    <a:lumMod val="85000"/>
-                  </a:schemeClr>
-                </a:solidFill>
-                <a:latin typeface="Consolas" panose="020B0609020204030204" pitchFamily="49" charset="0"/>
-              </a:rPr>
-              <a:t>Note</a:t>
-            </a:r>
-            <a:r>
               <a:rPr lang="en-US" sz="2000" dirty="0">
                 <a:solidFill>
                   <a:schemeClr val="bg1">
@@ -7775,23 +7586,12 @@
                 </a:solidFill>
                 <a:latin typeface="Consolas" panose="020B0609020204030204" pitchFamily="49" charset="0"/>
               </a:rPr>
-              <a:t>: Objects have changed outside of </a:t>
-            </a:r>
-            <a:r>
-              <a:rPr lang="en-US" sz="2000" dirty="0" smtClean="0">
-                <a:solidFill>
-                  <a:schemeClr val="bg1">
-                    <a:lumMod val="85000"/>
-                  </a:schemeClr>
-                </a:solidFill>
-                <a:latin typeface="Consolas" panose="020B0609020204030204" pitchFamily="49" charset="0"/>
-              </a:rPr>
-              <a:t>Terraform</a:t>
-            </a:r>
-          </a:p>
-          <a:p>
-            <a:r>
-              <a:rPr lang="en-US" sz="2000" dirty="0" smtClean="0">
+              <a:t>Note: Objects have changed outside of Terraform</a:t>
+            </a:r>
+          </a:p>
+          <a:p>
+            <a:r>
+              <a:rPr lang="en-US" sz="2000" dirty="0">
                 <a:solidFill>
                   <a:schemeClr val="bg1">
                     <a:lumMod val="85000"/>
@@ -7812,23 +7612,12 @@
                 </a:solidFill>
                 <a:latin typeface="Consolas" panose="020B0609020204030204" pitchFamily="49" charset="0"/>
               </a:rPr>
-              <a:t>Would you like to update the Terraform state to reflect these detected changes</a:t>
-            </a:r>
-            <a:r>
-              <a:rPr lang="en-US" sz="2000" b="1" dirty="0" smtClean="0">
-                <a:solidFill>
-                  <a:schemeClr val="bg1">
-                    <a:lumMod val="85000"/>
-                  </a:schemeClr>
-                </a:solidFill>
-                <a:latin typeface="Consolas" panose="020B0609020204030204" pitchFamily="49" charset="0"/>
-              </a:rPr>
-              <a:t>?</a:t>
-            </a:r>
-          </a:p>
-          <a:p>
-            <a:r>
-              <a:rPr lang="en-US" sz="2000" dirty="0" smtClean="0">
+              <a:t>Would you like to update the Terraform state to reflect these detected changes?</a:t>
+            </a:r>
+          </a:p>
+          <a:p>
+            <a:r>
+              <a:rPr lang="en-US" sz="2000" dirty="0">
                 <a:solidFill>
                   <a:schemeClr val="bg1">
                     <a:lumMod val="85000"/>
@@ -7838,14 +7627,6 @@
               </a:rPr>
               <a:t>Enter a value:</a:t>
             </a:r>
-            <a:endParaRPr lang="en-US" sz="2000" dirty="0">
-              <a:solidFill>
-                <a:schemeClr val="bg1">
-                  <a:lumMod val="85000"/>
-                </a:schemeClr>
-              </a:solidFill>
-              <a:latin typeface="Consolas" panose="020B0609020204030204" pitchFamily="49" charset="0"/>
-            </a:endParaRPr>
           </a:p>
         </p:txBody>
       </p:sp>
@@ -7896,26 +7677,22 @@
           <a:p>
             <a:r>
               <a:rPr lang="de-DE" dirty="0" err="1"/>
-              <a:t>t</a:t>
-            </a:r>
-            <a:r>
-              <a:rPr lang="de-DE" dirty="0" err="1" smtClean="0"/>
-              <a:t>erraform</a:t>
-            </a:r>
-            <a:r>
-              <a:rPr lang="de-DE" dirty="0" smtClean="0"/>
+              <a:t>terraform</a:t>
+            </a:r>
+            <a:r>
+              <a:rPr lang="de-DE" dirty="0"/>
               <a:t> </a:t>
             </a:r>
             <a:r>
-              <a:rPr lang="de-DE" dirty="0" err="1" smtClean="0"/>
+              <a:rPr lang="de-DE" dirty="0" err="1"/>
               <a:t>apply</a:t>
             </a:r>
             <a:r>
-              <a:rPr lang="de-DE" dirty="0" smtClean="0"/>
+              <a:rPr lang="de-DE" dirty="0"/>
               <a:t> -</a:t>
             </a:r>
             <a:r>
-              <a:rPr lang="de-DE" dirty="0" err="1" smtClean="0"/>
+              <a:rPr lang="de-DE" dirty="0" err="1"/>
               <a:t>replace</a:t>
             </a:r>
             <a:endParaRPr lang="de-DE" dirty="0"/>
@@ -7938,31 +7715,30 @@
           <a:lstStyle/>
           <a:p>
             <a:r>
-              <a:rPr lang="de-DE" dirty="0" smtClean="0"/>
+              <a:rPr lang="de-DE" dirty="0"/>
               <a:t>Explizites </a:t>
             </a:r>
             <a:r>
-              <a:rPr lang="de-DE" dirty="0" err="1" smtClean="0"/>
+              <a:rPr lang="de-DE" dirty="0" err="1"/>
               <a:t>Destroy</a:t>
             </a:r>
             <a:r>
-              <a:rPr lang="de-DE" dirty="0" smtClean="0"/>
+              <a:rPr lang="de-DE" dirty="0"/>
               <a:t> </a:t>
             </a:r>
             <a:r>
-              <a:rPr lang="de-DE" dirty="0" err="1" smtClean="0"/>
+              <a:rPr lang="de-DE" dirty="0" err="1"/>
               <a:t>and</a:t>
             </a:r>
             <a:r>
-              <a:rPr lang="de-DE" dirty="0" smtClean="0"/>
+              <a:rPr lang="de-DE" dirty="0"/>
               <a:t> Create einer Ressource </a:t>
             </a:r>
-            <a:endParaRPr lang="de-DE" dirty="0"/>
           </a:p>
           <a:p>
             <a:pPr lvl="1"/>
             <a:r>
-              <a:rPr lang="de-DE" dirty="0" smtClean="0"/>
+              <a:rPr lang="de-DE" dirty="0"/>
               <a:t>Auch wenn Terraform keine Änderungen an der Konfiguration erkennt</a:t>
             </a:r>
           </a:p>
@@ -7980,23 +7756,19 @@
               <a:t> </a:t>
             </a:r>
             <a:r>
-              <a:rPr lang="de-DE" i="1" dirty="0" err="1" smtClean="0"/>
+              <a:rPr lang="de-DE" i="1" dirty="0" err="1"/>
               <a:t>taint</a:t>
             </a:r>
             <a:r>
-              <a:rPr lang="de-DE" i="1" dirty="0" smtClean="0"/>
+              <a:rPr lang="de-DE" i="1" dirty="0"/>
               <a:t> </a:t>
             </a:r>
           </a:p>
           <a:p>
             <a:pPr lvl="1"/>
             <a:r>
-              <a:rPr lang="de-DE" dirty="0" smtClean="0"/>
-              <a:t>(seit </a:t>
-            </a:r>
-            <a:r>
-              <a:rPr lang="de-DE" dirty="0"/>
-              <a:t>v0.15.4 </a:t>
+              <a:rPr lang="de-DE" dirty="0"/>
+              <a:t>(seit v0.15.4 </a:t>
             </a:r>
             <a:r>
               <a:rPr lang="de-DE" dirty="0" err="1"/>
@@ -8011,7 +7783,7 @@
             <a:pPr marL="0" indent="0">
               <a:buNone/>
             </a:pPr>
-            <a:endParaRPr lang="de-DE" dirty="0" smtClean="0"/>
+            <a:endParaRPr lang="de-DE" dirty="0"/>
           </a:p>
         </p:txBody>
       </p:sp>
@@ -8040,7 +7812,7 @@
           <a:lstStyle/>
           <a:p>
             <a:r>
-              <a:rPr lang="de-DE" sz="2000" dirty="0" smtClean="0">
+              <a:rPr lang="de-DE" sz="2000" dirty="0">
                 <a:solidFill>
                   <a:schemeClr val="bg1">
                     <a:lumMod val="85000"/>
@@ -8062,7 +7834,7 @@
               <a:t>terraform apply -replace="</a:t>
             </a:r>
             <a:r>
-              <a:rPr lang="en-US" sz="2000" dirty="0" err="1" smtClean="0">
+              <a:rPr lang="en-US" sz="2000" dirty="0" err="1">
                 <a:solidFill>
                   <a:schemeClr val="bg1">
                     <a:lumMod val="85000"/>
@@ -8073,7 +7845,7 @@
               <a:t>aws_instance.webserver</a:t>
             </a:r>
             <a:r>
-              <a:rPr lang="en-US" sz="2000" dirty="0" smtClean="0">
+              <a:rPr lang="en-US" sz="2000" dirty="0">
                 <a:solidFill>
                   <a:schemeClr val="bg1">
                     <a:lumMod val="85000"/>
@@ -8086,7 +7858,7 @@
           </a:p>
           <a:p>
             <a:r>
-              <a:rPr lang="en-US" sz="2000" dirty="0" smtClean="0">
+              <a:rPr lang="en-US" sz="2000" dirty="0">
                 <a:solidFill>
                   <a:schemeClr val="bg1">
                     <a:lumMod val="85000"/>
@@ -8177,7 +7949,7 @@
           </a:p>
           <a:p>
             <a:r>
-              <a:rPr lang="en-US" sz="2000" dirty="0" smtClean="0">
+              <a:rPr lang="en-US" sz="2000" dirty="0">
                 <a:solidFill>
                   <a:schemeClr val="bg1">
                     <a:lumMod val="85000"/>
@@ -8203,7 +7975,7 @@
           </a:p>
           <a:p>
             <a:r>
-              <a:rPr lang="en-US" sz="2000" dirty="0" smtClean="0">
+              <a:rPr lang="en-US" sz="2000" dirty="0">
                 <a:solidFill>
                   <a:schemeClr val="bg1">
                     <a:lumMod val="85000"/>
@@ -8213,14 +7985,6 @@
               </a:rPr>
               <a:t>Enter a value:</a:t>
             </a:r>
-            <a:endParaRPr lang="en-US" sz="2000" dirty="0">
-              <a:solidFill>
-                <a:schemeClr val="bg1">
-                  <a:lumMod val="85000"/>
-                </a:schemeClr>
-              </a:solidFill>
-              <a:latin typeface="Consolas" panose="020B0609020204030204" pitchFamily="49" charset="0"/>
-            </a:endParaRPr>
           </a:p>
         </p:txBody>
       </p:sp>
@@ -8271,23 +8035,15 @@
           <a:p>
             <a:r>
               <a:rPr lang="de-DE" dirty="0" err="1"/>
-              <a:t>t</a:t>
-            </a:r>
-            <a:r>
-              <a:rPr lang="de-DE" dirty="0" err="1" smtClean="0"/>
-              <a:t>erraform</a:t>
-            </a:r>
-            <a:r>
-              <a:rPr lang="de-DE" dirty="0" smtClean="0"/>
+              <a:t>terraform</a:t>
+            </a:r>
+            <a:r>
+              <a:rPr lang="de-DE" dirty="0"/>
               <a:t> </a:t>
             </a:r>
             <a:r>
               <a:rPr lang="de-DE" dirty="0" err="1"/>
-              <a:t>d</a:t>
-            </a:r>
-            <a:r>
-              <a:rPr lang="de-DE" dirty="0" err="1" smtClean="0"/>
-              <a:t>estroy</a:t>
+              <a:t>destroy</a:t>
             </a:r>
             <a:endParaRPr lang="de-DE" dirty="0"/>
           </a:p>
@@ -8309,24 +8065,23 @@
           <a:lstStyle/>
           <a:p>
             <a:r>
-              <a:rPr lang="de-DE" dirty="0" smtClean="0"/>
+              <a:rPr lang="de-DE" dirty="0"/>
               <a:t>Löscht alle Ressourcen die in der Terraform Konfiguration </a:t>
             </a:r>
             <a:r>
-              <a:rPr lang="de-DE" dirty="0" err="1" smtClean="0"/>
+              <a:rPr lang="de-DE" dirty="0" err="1"/>
               <a:t>gemanaged</a:t>
             </a:r>
             <a:r>
-              <a:rPr lang="de-DE" dirty="0" smtClean="0"/>
+              <a:rPr lang="de-DE" dirty="0"/>
               <a:t> sind</a:t>
             </a:r>
           </a:p>
           <a:p>
             <a:r>
-              <a:rPr lang="de-DE" dirty="0" smtClean="0"/>
+              <a:rPr lang="de-DE" dirty="0"/>
               <a:t>Nützlich um Feature-Umgebungen wieder abzubauen</a:t>
             </a:r>
-            <a:endParaRPr lang="de-DE" dirty="0"/>
           </a:p>
         </p:txBody>
       </p:sp>
@@ -8355,7 +8110,7 @@
           <a:lstStyle/>
           <a:p>
             <a:r>
-              <a:rPr lang="de-DE" sz="2000" dirty="0" smtClean="0">
+              <a:rPr lang="de-DE" sz="2000" dirty="0">
                 <a:solidFill>
                   <a:schemeClr val="bg1">
                     <a:lumMod val="85000"/>
@@ -8374,23 +8129,12 @@
                 </a:solidFill>
                 <a:latin typeface="Consolas" panose="020B0609020204030204" pitchFamily="49" charset="0"/>
               </a:rPr>
-              <a:t>terraform </a:t>
-            </a:r>
-            <a:r>
-              <a:rPr lang="en-US" sz="2000" dirty="0" smtClean="0">
-                <a:solidFill>
-                  <a:schemeClr val="bg1">
-                    <a:lumMod val="85000"/>
-                  </a:schemeClr>
-                </a:solidFill>
-                <a:latin typeface="Consolas" panose="020B0609020204030204" pitchFamily="49" charset="0"/>
-              </a:rPr>
-              <a:t>destroy</a:t>
-            </a:r>
-          </a:p>
-          <a:p>
-            <a:r>
-              <a:rPr lang="en-US" sz="2000" dirty="0" smtClean="0">
+              <a:t>terraform destroy</a:t>
+            </a:r>
+          </a:p>
+          <a:p>
+            <a:r>
+              <a:rPr lang="en-US" sz="2000" dirty="0">
                 <a:solidFill>
                   <a:schemeClr val="bg1">
                     <a:lumMod val="85000"/>
@@ -8416,7 +8160,7 @@
           </a:p>
           <a:p>
             <a:r>
-              <a:rPr lang="en-US" sz="2000" dirty="0" smtClean="0">
+              <a:rPr lang="en-US" sz="2000" dirty="0">
                 <a:solidFill>
                   <a:schemeClr val="bg1">
                     <a:lumMod val="85000"/>
@@ -8538,18 +8282,14 @@
           <a:p>
             <a:r>
               <a:rPr lang="de-DE" dirty="0" err="1"/>
-              <a:t>t</a:t>
-            </a:r>
-            <a:r>
-              <a:rPr lang="de-DE" dirty="0" err="1" smtClean="0"/>
-              <a:t>erraform</a:t>
-            </a:r>
-            <a:r>
-              <a:rPr lang="de-DE" dirty="0" smtClean="0"/>
+              <a:t>terraform</a:t>
+            </a:r>
+            <a:r>
+              <a:rPr lang="de-DE" dirty="0"/>
               <a:t> </a:t>
             </a:r>
             <a:r>
-              <a:rPr lang="de-DE" dirty="0" err="1" smtClean="0"/>
+              <a:rPr lang="de-DE" dirty="0" err="1"/>
               <a:t>validate</a:t>
             </a:r>
             <a:endParaRPr lang="de-DE" dirty="0"/>
@@ -8572,24 +8312,23 @@
           <a:lstStyle/>
           <a:p>
             <a:r>
-              <a:rPr lang="de-DE" dirty="0" smtClean="0"/>
+              <a:rPr lang="de-DE" dirty="0"/>
               <a:t>Validierung der aktuellen Terraform Konfiguration</a:t>
             </a:r>
           </a:p>
           <a:p>
             <a:pPr lvl="1"/>
             <a:r>
-              <a:rPr lang="de-DE" dirty="0" smtClean="0"/>
+              <a:rPr lang="de-DE" dirty="0"/>
               <a:t>Syntax und Konsistenz</a:t>
             </a:r>
           </a:p>
           <a:p>
             <a:pPr lvl="1"/>
             <a:r>
-              <a:rPr lang="de-DE" dirty="0" smtClean="0"/>
+              <a:rPr lang="de-DE" dirty="0"/>
               <a:t>Kein Abgleich mit State / Providers</a:t>
             </a:r>
-            <a:endParaRPr lang="de-DE" dirty="0"/>
           </a:p>
         </p:txBody>
       </p:sp>
@@ -8618,7 +8357,7 @@
           <a:lstStyle/>
           <a:p>
             <a:r>
-              <a:rPr lang="de-DE" sz="2000" dirty="0" smtClean="0">
+              <a:rPr lang="de-DE" sz="2000" dirty="0">
                 <a:solidFill>
                   <a:schemeClr val="bg1">
                     <a:lumMod val="85000"/>
@@ -8629,17 +8368,6 @@
               <a:t>C:\example &gt;</a:t>
             </a:r>
             <a:r>
-              <a:rPr lang="en-US" sz="2000" dirty="0" smtClean="0">
-                <a:solidFill>
-                  <a:schemeClr val="bg1">
-                    <a:lumMod val="85000"/>
-                  </a:schemeClr>
-                </a:solidFill>
-                <a:latin typeface="Consolas" panose="020B0609020204030204" pitchFamily="49" charset="0"/>
-              </a:rPr>
-              <a:t>terraform </a:t>
-            </a:r>
-            <a:r>
               <a:rPr lang="en-US" sz="2000" dirty="0">
                 <a:solidFill>
                   <a:schemeClr val="bg1">
@@ -8648,39 +8376,7 @@
                 </a:solidFill>
                 <a:latin typeface="Consolas" panose="020B0609020204030204" pitchFamily="49" charset="0"/>
               </a:rPr>
-              <a:t>validate</a:t>
-            </a:r>
-          </a:p>
-          <a:p>
-            <a:endParaRPr lang="en-US" sz="2000" dirty="0" smtClean="0">
-              <a:solidFill>
-                <a:schemeClr val="bg1">
-                  <a:lumMod val="85000"/>
-                </a:schemeClr>
-              </a:solidFill>
-              <a:latin typeface="Consolas" panose="020B0609020204030204" pitchFamily="49" charset="0"/>
-            </a:endParaRPr>
-          </a:p>
-          <a:p>
-            <a:r>
-              <a:rPr lang="en-US" sz="2000" dirty="0" smtClean="0">
-                <a:solidFill>
-                  <a:srgbClr val="FF0000"/>
-                </a:solidFill>
-                <a:latin typeface="Consolas" panose="020B0609020204030204" pitchFamily="49" charset="0"/>
-              </a:rPr>
-              <a:t>Error</a:t>
-            </a:r>
-            <a:r>
-              <a:rPr lang="en-US" sz="2000" dirty="0">
-                <a:solidFill>
-                  <a:schemeClr val="bg1">
-                    <a:lumMod val="85000"/>
-                  </a:schemeClr>
-                </a:solidFill>
-                <a:latin typeface="Consolas" panose="020B0609020204030204" pitchFamily="49" charset="0"/>
-              </a:rPr>
-              <a:t>: Reference to undeclared resource</a:t>
+              <a:t>terraform validate</a:t>
             </a:r>
           </a:p>
           <a:p>
@@ -8695,37 +8391,13 @@
           </a:p>
           <a:p>
             <a:r>
-              <a:rPr lang="en-US" sz="2000" dirty="0" smtClean="0">
-                <a:solidFill>
-                  <a:schemeClr val="bg1">
-                    <a:lumMod val="85000"/>
-                  </a:schemeClr>
-                </a:solidFill>
-                <a:latin typeface="Consolas" panose="020B0609020204030204" pitchFamily="49" charset="0"/>
-              </a:rPr>
-              <a:t>  </a:t>
-            </a:r>
-            <a:r>
               <a:rPr lang="en-US" sz="2000" dirty="0">
                 <a:solidFill>
-                  <a:schemeClr val="bg1">
-                    <a:lumMod val="85000"/>
-                  </a:schemeClr>
-                </a:solidFill>
-                <a:latin typeface="Consolas" panose="020B0609020204030204" pitchFamily="49" charset="0"/>
-              </a:rPr>
-              <a:t>on main.tf line 8, in resource "</a:t>
-            </a:r>
-            <a:r>
-              <a:rPr lang="en-US" sz="2000" dirty="0" err="1">
-                <a:solidFill>
-                  <a:schemeClr val="bg1">
-                    <a:lumMod val="85000"/>
-                  </a:schemeClr>
-                </a:solidFill>
-                <a:latin typeface="Consolas" panose="020B0609020204030204" pitchFamily="49" charset="0"/>
-              </a:rPr>
-              <a:t>aws_instance</a:t>
+                  <a:srgbClr val="FF0000"/>
+                </a:solidFill>
+                <a:latin typeface="Consolas" panose="020B0609020204030204" pitchFamily="49" charset="0"/>
+              </a:rPr>
+              <a:t>Error</a:t>
             </a:r>
             <a:r>
               <a:rPr lang="en-US" sz="2000" dirty="0">
@@ -8736,53 +8408,7 @@
                 </a:solidFill>
                 <a:latin typeface="Consolas" panose="020B0609020204030204" pitchFamily="49" charset="0"/>
               </a:rPr>
-              <a:t>" "webserver":</a:t>
-            </a:r>
-          </a:p>
-          <a:p>
-            <a:r>
-              <a:rPr lang="en-US" sz="2000" dirty="0" smtClean="0">
-                <a:solidFill>
-                  <a:schemeClr val="bg1">
-                    <a:lumMod val="85000"/>
-                  </a:schemeClr>
-                </a:solidFill>
-                <a:latin typeface="Consolas" panose="020B0609020204030204" pitchFamily="49" charset="0"/>
-              </a:rPr>
-              <a:t>    </a:t>
-            </a:r>
-            <a:r>
-              <a:rPr lang="en-US" sz="2000" dirty="0">
-                <a:solidFill>
-                  <a:schemeClr val="bg1">
-                    <a:lumMod val="85000"/>
-                  </a:schemeClr>
-                </a:solidFill>
-                <a:latin typeface="Consolas" panose="020B0609020204030204" pitchFamily="49" charset="0"/>
-              </a:rPr>
-              <a:t>8:   </a:t>
-            </a:r>
-            <a:r>
-              <a:rPr lang="en-US" sz="2000" dirty="0" err="1">
-                <a:solidFill>
-                  <a:schemeClr val="bg1">
-                    <a:lumMod val="85000"/>
-                  </a:schemeClr>
-                </a:solidFill>
-                <a:latin typeface="Consolas" panose="020B0609020204030204" pitchFamily="49" charset="0"/>
-              </a:rPr>
-              <a:t>security_groups</a:t>
-            </a:r>
-            <a:r>
-              <a:rPr lang="en-US" sz="2000" dirty="0">
-                <a:solidFill>
-                  <a:schemeClr val="bg1">
-                    <a:lumMod val="85000"/>
-                  </a:schemeClr>
-                </a:solidFill>
-                <a:latin typeface="Consolas" panose="020B0609020204030204" pitchFamily="49" charset="0"/>
-              </a:rPr>
-              <a:t> = [aws_security_group.webserve.name]</a:t>
+              <a:t>: Reference to undeclared resource</a:t>
             </a:r>
           </a:p>
           <a:p>
@@ -8797,17 +8423,6 @@
           </a:p>
           <a:p>
             <a:r>
-              <a:rPr lang="en-US" sz="2000" dirty="0" smtClean="0">
-                <a:solidFill>
-                  <a:schemeClr val="bg1">
-                    <a:lumMod val="85000"/>
-                  </a:schemeClr>
-                </a:solidFill>
-                <a:latin typeface="Consolas" panose="020B0609020204030204" pitchFamily="49" charset="0"/>
-              </a:rPr>
-              <a:t>A </a:t>
-            </a:r>
-            <a:r>
               <a:rPr lang="en-US" sz="2000" dirty="0">
                 <a:solidFill>
                   <a:schemeClr val="bg1">
@@ -8816,7 +8431,87 @@
                 </a:solidFill>
                 <a:latin typeface="Consolas" panose="020B0609020204030204" pitchFamily="49" charset="0"/>
               </a:rPr>
-              <a:t>managed resource "</a:t>
+              <a:t>  on main.tf line 8, in resource "</a:t>
+            </a:r>
+            <a:r>
+              <a:rPr lang="en-US" sz="2000" dirty="0" err="1">
+                <a:solidFill>
+                  <a:schemeClr val="bg1">
+                    <a:lumMod val="85000"/>
+                  </a:schemeClr>
+                </a:solidFill>
+                <a:latin typeface="Consolas" panose="020B0609020204030204" pitchFamily="49" charset="0"/>
+              </a:rPr>
+              <a:t>aws_instance</a:t>
+            </a:r>
+            <a:r>
+              <a:rPr lang="en-US" sz="2000" dirty="0">
+                <a:solidFill>
+                  <a:schemeClr val="bg1">
+                    <a:lumMod val="85000"/>
+                  </a:schemeClr>
+                </a:solidFill>
+                <a:latin typeface="Consolas" panose="020B0609020204030204" pitchFamily="49" charset="0"/>
+              </a:rPr>
+              <a:t>" "webserver":</a:t>
+            </a:r>
+          </a:p>
+          <a:p>
+            <a:r>
+              <a:rPr lang="en-US" sz="2000" dirty="0">
+                <a:solidFill>
+                  <a:schemeClr val="bg1">
+                    <a:lumMod val="85000"/>
+                  </a:schemeClr>
+                </a:solidFill>
+                <a:latin typeface="Consolas" panose="020B0609020204030204" pitchFamily="49" charset="0"/>
+              </a:rPr>
+              <a:t>    8:   </a:t>
+            </a:r>
+            <a:r>
+              <a:rPr lang="en-US" sz="2000" dirty="0" err="1">
+                <a:solidFill>
+                  <a:schemeClr val="bg1">
+                    <a:lumMod val="85000"/>
+                  </a:schemeClr>
+                </a:solidFill>
+                <a:latin typeface="Consolas" panose="020B0609020204030204" pitchFamily="49" charset="0"/>
+              </a:rPr>
+              <a:t>security_groups</a:t>
+            </a:r>
+            <a:r>
+              <a:rPr lang="en-US" sz="2000" dirty="0">
+                <a:solidFill>
+                  <a:schemeClr val="bg1">
+                    <a:lumMod val="85000"/>
+                  </a:schemeClr>
+                </a:solidFill>
+                <a:latin typeface="Consolas" panose="020B0609020204030204" pitchFamily="49" charset="0"/>
+              </a:rPr>
+              <a:t> = [aws_security_group.webserve.name]</a:t>
+            </a:r>
+          </a:p>
+          <a:p>
+            <a:endParaRPr lang="en-US" sz="2000" dirty="0">
+              <a:solidFill>
+                <a:schemeClr val="bg1">
+                  <a:lumMod val="85000"/>
+                </a:schemeClr>
+              </a:solidFill>
+              <a:latin typeface="Consolas" panose="020B0609020204030204" pitchFamily="49" charset="0"/>
+            </a:endParaRPr>
+          </a:p>
+          <a:p>
+            <a:r>
+              <a:rPr lang="en-US" sz="2000" dirty="0">
+                <a:solidFill>
+                  <a:schemeClr val="bg1">
+                    <a:lumMod val="85000"/>
+                  </a:schemeClr>
+                </a:solidFill>
+                <a:latin typeface="Consolas" panose="020B0609020204030204" pitchFamily="49" charset="0"/>
+              </a:rPr>
+              <a:t>A managed resource "</a:t>
             </a:r>
             <a:r>
               <a:rPr lang="en-US" sz="2000" dirty="0" err="1">
@@ -8911,10 +8606,9 @@
           <a:lstStyle/>
           <a:p>
             <a:r>
-              <a:rPr lang="de-DE" dirty="0" smtClean="0"/>
+              <a:rPr lang="de-DE" dirty="0"/>
               <a:t>Agenda</a:t>
             </a:r>
-            <a:endParaRPr lang="de-DE" dirty="0"/>
           </a:p>
         </p:txBody>
       </p:sp>
@@ -8945,7 +8639,7 @@
               <a:buChar char="-"/>
             </a:pPr>
             <a:r>
-              <a:rPr lang="de-DE" dirty="0" smtClean="0"/>
+              <a:rPr lang="de-DE" dirty="0"/>
               <a:t>Vorstellungsrunde</a:t>
             </a:r>
           </a:p>
@@ -8955,15 +8649,15 @@
               <a:buChar char="-"/>
             </a:pPr>
             <a:r>
-              <a:rPr lang="de-DE" dirty="0" smtClean="0"/>
+              <a:rPr lang="de-DE" dirty="0"/>
               <a:t>Einführung </a:t>
             </a:r>
             <a:r>
-              <a:rPr lang="de-DE" dirty="0" err="1" smtClean="0"/>
+              <a:rPr lang="de-DE" dirty="0" err="1"/>
               <a:t>IaC</a:t>
             </a:r>
             <a:r>
-              <a:rPr lang="de-DE" dirty="0" smtClean="0"/>
+              <a:rPr lang="de-DE" dirty="0"/>
               <a:t> und Terraform</a:t>
             </a:r>
           </a:p>
@@ -8973,7 +8667,7 @@
               <a:buChar char="-"/>
             </a:pPr>
             <a:r>
-              <a:rPr lang="de-DE" dirty="0" smtClean="0"/>
+              <a:rPr lang="de-DE" dirty="0"/>
               <a:t>Setup</a:t>
             </a:r>
           </a:p>
@@ -8983,7 +8677,7 @@
               <a:buChar char="-"/>
             </a:pPr>
             <a:r>
-              <a:rPr lang="de-DE" dirty="0" smtClean="0"/>
+              <a:rPr lang="de-DE" dirty="0"/>
               <a:t>Providers</a:t>
             </a:r>
           </a:p>
@@ -8993,7 +8687,7 @@
               <a:buChar char="-"/>
             </a:pPr>
             <a:r>
-              <a:rPr lang="de-DE" dirty="0" smtClean="0"/>
+              <a:rPr lang="de-DE" dirty="0"/>
               <a:t>Ressourcen</a:t>
             </a:r>
           </a:p>
@@ -9003,7 +8697,7 @@
               <a:buChar char="-"/>
             </a:pPr>
             <a:r>
-              <a:rPr lang="de-DE" dirty="0" smtClean="0"/>
+              <a:rPr lang="de-DE" dirty="0"/>
               <a:t>Variablen</a:t>
             </a:r>
           </a:p>
@@ -9013,14 +8707,14 @@
               <a:buChar char="-"/>
             </a:pPr>
             <a:r>
-              <a:rPr lang="de-DE" dirty="0" smtClean="0"/>
+              <a:rPr lang="de-DE" dirty="0"/>
               <a:t>Data </a:t>
             </a:r>
             <a:r>
-              <a:rPr lang="de-DE" dirty="0" err="1" smtClean="0"/>
+              <a:rPr lang="de-DE" dirty="0" err="1"/>
               <a:t>Sources</a:t>
             </a:r>
-            <a:endParaRPr lang="de-DE" dirty="0" smtClean="0"/>
+            <a:endParaRPr lang="de-DE" dirty="0"/>
           </a:p>
           <a:p>
             <a:pPr>
@@ -9028,10 +8722,10 @@
               <a:buChar char="-"/>
             </a:pPr>
             <a:r>
-              <a:rPr lang="de-DE" dirty="0" err="1" smtClean="0"/>
+              <a:rPr lang="de-DE" dirty="0" err="1"/>
               <a:t>Functions</a:t>
             </a:r>
-            <a:endParaRPr lang="de-DE" dirty="0" smtClean="0"/>
+            <a:endParaRPr lang="de-DE" dirty="0"/>
           </a:p>
           <a:p>
             <a:pPr>
@@ -9039,7 +8733,7 @@
               <a:buChar char="-"/>
             </a:pPr>
             <a:r>
-              <a:rPr lang="de-DE" dirty="0" smtClean="0"/>
+              <a:rPr lang="de-DE" dirty="0"/>
               <a:t>Workshop – freie praktische Übungen</a:t>
             </a:r>
           </a:p>
@@ -9271,15 +8965,15 @@
               <a:t>Tipps &amp; </a:t>
             </a:r>
             <a:r>
-              <a:rPr lang="de-DE" sz="2600" dirty="0" err="1" smtClean="0"/>
+              <a:rPr lang="de-DE" sz="2600" dirty="0" err="1"/>
               <a:t>Lessons</a:t>
             </a:r>
             <a:r>
-              <a:rPr lang="de-DE" sz="2600" dirty="0" smtClean="0"/>
+              <a:rPr lang="de-DE" sz="2600" dirty="0"/>
               <a:t> </a:t>
             </a:r>
             <a:r>
-              <a:rPr lang="de-DE" sz="2600" dirty="0" err="1" smtClean="0"/>
+              <a:rPr lang="de-DE" sz="2600" dirty="0" err="1"/>
               <a:t>Learned</a:t>
             </a:r>
             <a:endParaRPr lang="de-DE" sz="2600" dirty="0"/>
@@ -9298,7 +8992,7 @@
             <a:pPr marL="0" indent="0">
               <a:buNone/>
             </a:pPr>
-            <a:endParaRPr lang="de-DE" dirty="0" smtClean="0"/>
+            <a:endParaRPr lang="de-DE" dirty="0"/>
           </a:p>
         </p:txBody>
       </p:sp>
@@ -9312,13 +9006,6 @@
   <p:clrMapOvr>
     <a:masterClrMapping/>
   </p:clrMapOvr>
-  <p:timing>
-    <p:tnLst>
-      <p:par>
-        <p:cTn id="1" dur="indefinite" restart="never" nodeType="tmRoot"/>
-      </p:par>
-    </p:tnLst>
-  </p:timing>
 </p:sld>
 </file>
 
@@ -9355,10 +9042,9 @@
           <a:lstStyle/>
           <a:p>
             <a:r>
-              <a:rPr lang="de-DE" dirty="0" smtClean="0"/>
+              <a:rPr lang="de-DE" dirty="0"/>
               <a:t>Vorbereitung</a:t>
             </a:r>
-            <a:endParaRPr lang="de-DE" dirty="0"/>
           </a:p>
         </p:txBody>
       </p:sp>
@@ -9388,7 +9074,7 @@
               <a:buNone/>
             </a:pPr>
             <a:r>
-              <a:rPr lang="de-DE" dirty="0" smtClean="0"/>
+              <a:rPr lang="de-DE" dirty="0"/>
               <a:t>A Cloud Guru Account</a:t>
             </a:r>
           </a:p>
@@ -9400,15 +9086,9 @@
               <a:rPr lang="de-DE" dirty="0">
                 <a:hlinkClick r:id="rId3"/>
               </a:rPr>
-              <a:t>https://acloudguru.com</a:t>
-            </a:r>
-            <a:r>
-              <a:rPr lang="de-DE" dirty="0" smtClean="0">
-                <a:hlinkClick r:id="rId3"/>
-              </a:rPr>
-              <a:t>/</a:t>
-            </a:r>
-            <a:endParaRPr lang="de-DE" dirty="0" smtClean="0"/>
+              <a:t>https://acloudguru.com/</a:t>
+            </a:r>
+            <a:endParaRPr lang="de-DE" dirty="0"/>
           </a:p>
           <a:p>
             <a:pPr marL="0" indent="0">
@@ -9421,7 +9101,7 @@
               <a:buNone/>
             </a:pPr>
             <a:r>
-              <a:rPr lang="de-DE" dirty="0" smtClean="0"/>
+              <a:rPr lang="de-DE" dirty="0"/>
               <a:t>AWS CLI</a:t>
             </a:r>
           </a:p>
@@ -9433,15 +9113,9 @@
               <a:rPr lang="de-DE" dirty="0">
                 <a:hlinkClick r:id="rId4"/>
               </a:rPr>
-              <a:t>https://</a:t>
-            </a:r>
-            <a:r>
-              <a:rPr lang="de-DE" dirty="0" smtClean="0">
-                <a:hlinkClick r:id="rId4"/>
-              </a:rPr>
-              <a:t>docs.aws.amazon.com/cli/latest/userguide/getting-started-install.html</a:t>
-            </a:r>
-            <a:endParaRPr lang="de-DE" dirty="0" smtClean="0"/>
+              <a:t>https://docs.aws.amazon.com/cli/latest/userguide/getting-started-install.html</a:t>
+            </a:r>
+            <a:endParaRPr lang="de-DE" dirty="0"/>
           </a:p>
           <a:p>
             <a:pPr marL="0" indent="0">
@@ -9454,7 +9128,7 @@
               <a:buNone/>
             </a:pPr>
             <a:r>
-              <a:rPr lang="de-DE" dirty="0" smtClean="0"/>
+              <a:rPr lang="de-DE" dirty="0"/>
               <a:t>Terraform CLI</a:t>
             </a:r>
           </a:p>
@@ -9463,30 +9137,18 @@
               <a:buNone/>
             </a:pPr>
             <a:r>
-              <a:rPr lang="de-DE" dirty="0" smtClean="0">
-                <a:hlinkClick r:id="rId5"/>
-              </a:rPr>
-              <a:t>https</a:t>
-            </a:r>
-            <a:r>
               <a:rPr lang="de-DE" dirty="0">
                 <a:hlinkClick r:id="rId5"/>
               </a:rPr>
-              <a:t>://</a:t>
-            </a:r>
-            <a:r>
-              <a:rPr lang="de-DE" dirty="0" smtClean="0">
-                <a:hlinkClick r:id="rId5"/>
-              </a:rPr>
-              <a:t>www.terraform.io/downloads.html</a:t>
-            </a:r>
-            <a:endParaRPr lang="de-DE" dirty="0" smtClean="0"/>
+              <a:t>https://www.terraform.io/downloads.html</a:t>
+            </a:r>
+            <a:endParaRPr lang="de-DE" dirty="0"/>
           </a:p>
           <a:p>
             <a:pPr marL="0" indent="0">
               <a:buNone/>
             </a:pPr>
-            <a:endParaRPr lang="de-DE" dirty="0" smtClean="0"/>
+            <a:endParaRPr lang="de-DE" dirty="0"/>
           </a:p>
         </p:txBody>
       </p:sp>
@@ -9500,13 +9162,6 @@
   <p:clrMapOvr>
     <a:masterClrMapping/>
   </p:clrMapOvr>
-  <p:timing>
-    <p:tnLst>
-      <p:par>
-        <p:cTn id="1" dur="indefinite" restart="never" nodeType="tmRoot"/>
-      </p:par>
-    </p:tnLst>
-  </p:timing>
 </p:sld>
 </file>
 
@@ -9543,10 +9198,9 @@
           <a:lstStyle/>
           <a:p>
             <a:r>
-              <a:rPr lang="de-DE" dirty="0" smtClean="0"/>
+              <a:rPr lang="de-DE" dirty="0"/>
               <a:t>Vorstellungsrunde</a:t>
             </a:r>
-            <a:endParaRPr lang="de-DE" dirty="0"/>
           </a:p>
         </p:txBody>
       </p:sp>
@@ -9571,51 +9225,47 @@
           <a:lstStyle/>
           <a:p>
             <a:r>
-              <a:rPr lang="de-DE" dirty="0" smtClean="0"/>
+              <a:rPr lang="de-DE" dirty="0"/>
               <a:t>Wer seid ihr?</a:t>
             </a:r>
           </a:p>
           <a:p>
             <a:r>
-              <a:rPr lang="de-DE" dirty="0" smtClean="0"/>
+              <a:rPr lang="de-DE" dirty="0"/>
               <a:t>Wo ist euer fachlicher Schwerpunkt?</a:t>
             </a:r>
           </a:p>
           <a:p>
             <a:r>
-              <a:rPr lang="de-DE" dirty="0" smtClean="0"/>
+              <a:rPr lang="de-DE" dirty="0"/>
               <a:t>Was habt ihr für Vorkenntnisse mit den Cloud-</a:t>
             </a:r>
             <a:r>
-              <a:rPr lang="de-DE" dirty="0" err="1" smtClean="0"/>
+              <a:rPr lang="de-DE" dirty="0" err="1"/>
               <a:t>Hyperscalern</a:t>
             </a:r>
             <a:r>
-              <a:rPr lang="de-DE" dirty="0" smtClean="0"/>
+              <a:rPr lang="de-DE" dirty="0"/>
               <a:t> (AWS, </a:t>
             </a:r>
             <a:r>
-              <a:rPr lang="de-DE" dirty="0" err="1" smtClean="0"/>
+              <a:rPr lang="de-DE" dirty="0" err="1"/>
               <a:t>Azure</a:t>
             </a:r>
             <a:r>
               <a:rPr lang="de-DE" dirty="0"/>
-              <a:t> </a:t>
-            </a:r>
-            <a:r>
-              <a:rPr lang="de-DE" dirty="0" smtClean="0"/>
-              <a:t>und GCP)?</a:t>
-            </a:r>
-          </a:p>
-          <a:p>
-            <a:r>
-              <a:rPr lang="de-DE" dirty="0" smtClean="0"/>
+              <a:t> und GCP)?</a:t>
+            </a:r>
+          </a:p>
+          <a:p>
+            <a:r>
+              <a:rPr lang="de-DE" dirty="0"/>
               <a:t>Was habt ihr für Vorkenntnisse mit Terraform?</a:t>
             </a:r>
           </a:p>
           <a:p>
             <a:r>
-              <a:rPr lang="de-DE" dirty="0" smtClean="0"/>
+              <a:rPr lang="de-DE" dirty="0"/>
               <a:t>Was sind eure Erwartungen an die Schulung?</a:t>
             </a:r>
           </a:p>
@@ -9631,13 +9281,6 @@
   <p:clrMapOvr>
     <a:masterClrMapping/>
   </p:clrMapOvr>
-  <p:timing>
-    <p:tnLst>
-      <p:par>
-        <p:cTn id="1" dur="indefinite" restart="never" nodeType="tmRoot"/>
-      </p:par>
-    </p:tnLst>
-  </p:timing>
 </p:sld>
 </file>
 
@@ -9674,11 +9317,11 @@
           <a:lstStyle/>
           <a:p>
             <a:r>
-              <a:rPr lang="de-DE" dirty="0" smtClean="0"/>
+              <a:rPr lang="de-DE" dirty="0"/>
               <a:t>Definition: </a:t>
             </a:r>
             <a:r>
-              <a:rPr lang="de-DE" dirty="0" err="1" smtClean="0"/>
+              <a:rPr lang="de-DE" dirty="0" err="1"/>
               <a:t>IaC</a:t>
             </a:r>
             <a:endParaRPr lang="de-DE" dirty="0"/>
@@ -9709,20 +9352,8 @@
               <a:buNone/>
             </a:pPr>
             <a:r>
-              <a:rPr lang="en-US" dirty="0" smtClean="0"/>
-              <a:t>„Infrastructure </a:t>
-            </a:r>
-            <a:r>
               <a:rPr lang="en-US" dirty="0"/>
-              <a:t>as code is an approach to infrastructure automation based on practices from software development</a:t>
-            </a:r>
-            <a:r>
-              <a:rPr lang="en-US" dirty="0" smtClean="0"/>
-              <a:t>. </a:t>
-            </a:r>
-            <a:r>
-              <a:rPr lang="en-US" dirty="0"/>
-              <a:t>It emphasizes </a:t>
+              <a:t>„Infrastructure as code is an approach to infrastructure automation based on practices from software development. It emphasizes </a:t>
             </a:r>
             <a:r>
               <a:rPr lang="en-US" b="1" dirty="0"/>
@@ -9738,11 +9369,7 @@
             </a:r>
             <a:r>
               <a:rPr lang="en-US" dirty="0"/>
-              <a:t> routines for provisioning and changing systems and their configuration. Changes are made to definitions and then rolled out to systems through unattended processes that include thorough validation</a:t>
-            </a:r>
-            <a:r>
-              <a:rPr lang="en-US" dirty="0" smtClean="0"/>
-              <a:t>.”</a:t>
+              <a:t> routines for provisioning and changing systems and their configuration. Changes are made to definitions and then rolled out to systems through unattended processes that include thorough validation.”</a:t>
             </a:r>
           </a:p>
           <a:p>
@@ -9750,15 +9377,15 @@
               <a:buNone/>
             </a:pPr>
             <a:r>
-              <a:rPr lang="en-US" dirty="0" smtClean="0"/>
+              <a:rPr lang="en-US" dirty="0"/>
               <a:t>- </a:t>
             </a:r>
             <a:r>
-              <a:rPr lang="en-US" dirty="0" err="1" smtClean="0"/>
+              <a:rPr lang="en-US" dirty="0" err="1"/>
               <a:t>Keif</a:t>
             </a:r>
             <a:r>
-              <a:rPr lang="en-US" dirty="0" smtClean="0"/>
+              <a:rPr lang="en-US" dirty="0"/>
               <a:t> Morris </a:t>
             </a:r>
             <a:endParaRPr lang="de-DE" dirty="0"/>
@@ -9841,11 +9468,11 @@
           <a:lstStyle/>
           <a:p>
             <a:r>
-              <a:rPr lang="de-DE" dirty="0" smtClean="0"/>
+              <a:rPr lang="de-DE" dirty="0"/>
               <a:t>Motivation </a:t>
             </a:r>
             <a:r>
-              <a:rPr lang="de-DE" dirty="0" err="1" smtClean="0"/>
+              <a:rPr lang="de-DE" dirty="0" err="1"/>
               <a:t>IaC</a:t>
             </a:r>
             <a:endParaRPr lang="de-DE" dirty="0"/>
@@ -9879,10 +9506,10 @@
               <a:buChar char="-"/>
             </a:pPr>
             <a:r>
-              <a:rPr lang="de-DE" dirty="0" err="1" smtClean="0"/>
+              <a:rPr lang="de-DE" dirty="0" err="1"/>
               <a:t>Versionierung</a:t>
             </a:r>
-            <a:endParaRPr lang="de-DE" dirty="0" smtClean="0"/>
+            <a:endParaRPr lang="de-DE" dirty="0"/>
           </a:p>
           <a:p>
             <a:pPr lvl="1">
@@ -9890,7 +9517,7 @@
               <a:buChar char="-"/>
             </a:pPr>
             <a:r>
-              <a:rPr lang="de-DE" dirty="0" smtClean="0"/>
+              <a:rPr lang="de-DE" dirty="0"/>
               <a:t>Konfiguration unterliegt Versionskontrolle</a:t>
             </a:r>
           </a:p>
@@ -9900,7 +9527,7 @@
               <a:buChar char="-"/>
             </a:pPr>
             <a:r>
-              <a:rPr lang="de-DE" dirty="0" smtClean="0"/>
+              <a:rPr lang="de-DE" dirty="0"/>
               <a:t>Dokumentation</a:t>
             </a:r>
           </a:p>
@@ -9910,7 +9537,7 @@
               <a:buChar char="-"/>
             </a:pPr>
             <a:r>
-              <a:rPr lang="de-DE" dirty="0" smtClean="0"/>
+              <a:rPr lang="de-DE" dirty="0"/>
               <a:t>Beschreibung der Infrastruktur in menschenlesbarem Code</a:t>
             </a:r>
           </a:p>
@@ -9920,7 +9547,7 @@
               <a:buChar char="-"/>
             </a:pPr>
             <a:r>
-              <a:rPr lang="de-DE" dirty="0" smtClean="0"/>
+              <a:rPr lang="de-DE" dirty="0"/>
               <a:t>Wiederverwendbarkeit</a:t>
             </a:r>
           </a:p>
@@ -9930,7 +9557,7 @@
               <a:buChar char="-"/>
             </a:pPr>
             <a:r>
-              <a:rPr lang="de-DE" dirty="0" smtClean="0"/>
+              <a:rPr lang="de-DE" dirty="0"/>
               <a:t>Einfaches wiederverwenden einzelner Module oder ganzer Environments</a:t>
             </a:r>
           </a:p>
@@ -9940,14 +9567,14 @@
               <a:buChar char="-"/>
             </a:pPr>
             <a:r>
-              <a:rPr lang="de-DE" dirty="0" smtClean="0"/>
+              <a:rPr lang="de-DE" dirty="0"/>
               <a:t>Schnelles und sicheres Set-</a:t>
             </a:r>
             <a:r>
-              <a:rPr lang="de-DE" dirty="0" err="1" smtClean="0"/>
+              <a:rPr lang="de-DE" dirty="0" err="1"/>
               <a:t>Up</a:t>
             </a:r>
-            <a:endParaRPr lang="de-DE" dirty="0" smtClean="0"/>
+            <a:endParaRPr lang="de-DE" dirty="0"/>
           </a:p>
           <a:p>
             <a:pPr lvl="1">
@@ -9955,15 +9582,15 @@
               <a:buChar char="-"/>
             </a:pPr>
             <a:r>
-              <a:rPr lang="de-DE" dirty="0" smtClean="0"/>
+              <a:rPr lang="de-DE" dirty="0"/>
               <a:t>Manuelles Set-</a:t>
             </a:r>
             <a:r>
-              <a:rPr lang="de-DE" dirty="0" err="1" smtClean="0"/>
+              <a:rPr lang="de-DE" dirty="0" err="1"/>
               <a:t>Up</a:t>
             </a:r>
             <a:r>
-              <a:rPr lang="de-DE" dirty="0" smtClean="0"/>
+              <a:rPr lang="de-DE" dirty="0"/>
               <a:t> ist anfällig gegenüber Flüchtigkeitsfehlern</a:t>
             </a:r>
           </a:p>
@@ -9973,7 +9600,7 @@
               <a:buChar char="-"/>
             </a:pPr>
             <a:r>
-              <a:rPr lang="de-DE" dirty="0" smtClean="0"/>
+              <a:rPr lang="de-DE" dirty="0"/>
               <a:t>Validierung</a:t>
             </a:r>
           </a:p>
@@ -9983,10 +9610,9 @@
               <a:buChar char="-"/>
             </a:pPr>
             <a:r>
-              <a:rPr lang="de-DE" dirty="0" smtClean="0"/>
+              <a:rPr lang="de-DE" dirty="0"/>
               <a:t>Statische Analyse und Code Reviews</a:t>
             </a:r>
-            <a:endParaRPr lang="de-DE" dirty="0"/>
           </a:p>
         </p:txBody>
       </p:sp>
@@ -10067,14 +9693,13 @@
           <a:lstStyle/>
           <a:p>
             <a:r>
-              <a:rPr lang="de-DE" dirty="0" err="1" smtClean="0"/>
+              <a:rPr lang="de-DE" dirty="0" err="1"/>
               <a:t>Configuration</a:t>
             </a:r>
             <a:r>
-              <a:rPr lang="de-DE" dirty="0" smtClean="0"/>
+              <a:rPr lang="de-DE" dirty="0"/>
               <a:t> Management Tools</a:t>
             </a:r>
-            <a:endParaRPr lang="de-DE" dirty="0"/>
           </a:p>
         </p:txBody>
       </p:sp>
@@ -10094,10 +9719,9 @@
           <a:lstStyle/>
           <a:p>
             <a:r>
-              <a:rPr lang="de-DE" dirty="0" smtClean="0"/>
+              <a:rPr lang="de-DE" dirty="0"/>
               <a:t>Konfiguration und Installation auf existierenden Servern</a:t>
             </a:r>
-            <a:endParaRPr lang="de-DE" dirty="0"/>
           </a:p>
         </p:txBody>
       </p:sp>
@@ -10117,14 +9741,13 @@
           <a:lstStyle/>
           <a:p>
             <a:r>
-              <a:rPr lang="de-DE" dirty="0" err="1" smtClean="0"/>
+              <a:rPr lang="de-DE" dirty="0" err="1"/>
               <a:t>Provisioning</a:t>
             </a:r>
             <a:r>
-              <a:rPr lang="de-DE" dirty="0" smtClean="0"/>
+              <a:rPr lang="de-DE" dirty="0"/>
               <a:t> Tools</a:t>
             </a:r>
-            <a:endParaRPr lang="de-DE" dirty="0"/>
           </a:p>
         </p:txBody>
       </p:sp>
@@ -10144,22 +9767,21 @@
           <a:lstStyle/>
           <a:p>
             <a:r>
-              <a:rPr lang="de-DE" dirty="0" err="1" smtClean="0"/>
+              <a:rPr lang="de-DE" dirty="0" err="1"/>
               <a:t>Provisionierung</a:t>
             </a:r>
             <a:r>
-              <a:rPr lang="de-DE" dirty="0" smtClean="0"/>
+              <a:rPr lang="de-DE" dirty="0"/>
               <a:t> von </a:t>
             </a:r>
             <a:r>
-              <a:rPr lang="de-DE" dirty="0" err="1" smtClean="0"/>
+              <a:rPr lang="de-DE" dirty="0" err="1"/>
               <a:t>Resourcen</a:t>
             </a:r>
             <a:r>
-              <a:rPr lang="de-DE" dirty="0" smtClean="0"/>
+              <a:rPr lang="de-DE" dirty="0"/>
               <a:t> </a:t>
             </a:r>
-            <a:endParaRPr lang="de-DE" dirty="0"/>
           </a:p>
         </p:txBody>
       </p:sp>
@@ -10419,22 +10041,21 @@
           <a:lstStyle/>
           <a:p>
             <a:r>
-              <a:rPr lang="de-DE" dirty="0" err="1" smtClean="0"/>
+              <a:rPr lang="de-DE" dirty="0" err="1"/>
               <a:t>Mutable</a:t>
             </a:r>
             <a:r>
-              <a:rPr lang="de-DE" dirty="0" smtClean="0"/>
+              <a:rPr lang="de-DE" dirty="0"/>
               <a:t> vs. </a:t>
             </a:r>
             <a:r>
-              <a:rPr lang="de-DE" dirty="0" err="1" smtClean="0"/>
+              <a:rPr lang="de-DE" dirty="0" err="1"/>
               <a:t>Immutable</a:t>
             </a:r>
             <a:r>
-              <a:rPr lang="de-DE" dirty="0" smtClean="0"/>
+              <a:rPr lang="de-DE" dirty="0"/>
               <a:t> </a:t>
             </a:r>
-            <a:endParaRPr lang="de-DE" dirty="0"/>
           </a:p>
         </p:txBody>
       </p:sp>
@@ -10454,14 +10075,13 @@
           <a:lstStyle/>
           <a:p>
             <a:r>
-              <a:rPr lang="de-DE" dirty="0" err="1" smtClean="0"/>
+              <a:rPr lang="de-DE" dirty="0" err="1"/>
               <a:t>Mutable</a:t>
             </a:r>
             <a:r>
-              <a:rPr lang="de-DE" dirty="0" smtClean="0"/>
+              <a:rPr lang="de-DE" dirty="0"/>
               <a:t> Infrastructure</a:t>
             </a:r>
-            <a:endParaRPr lang="de-DE" dirty="0"/>
           </a:p>
         </p:txBody>
       </p:sp>
@@ -10481,46 +10101,45 @@
           <a:lstStyle/>
           <a:p>
             <a:r>
-              <a:rPr lang="de-DE" dirty="0" smtClean="0"/>
+              <a:rPr lang="de-DE" dirty="0"/>
               <a:t>Updates auf bestehender Infrastruktur</a:t>
             </a:r>
           </a:p>
           <a:p>
             <a:r>
-              <a:rPr lang="de-DE" dirty="0" smtClean="0"/>
+              <a:rPr lang="de-DE" dirty="0"/>
               <a:t>Standard bei den meisten </a:t>
             </a:r>
             <a:r>
-              <a:rPr lang="de-DE" dirty="0" err="1" smtClean="0"/>
+              <a:rPr lang="de-DE" dirty="0" err="1"/>
               <a:t>Configuration</a:t>
             </a:r>
             <a:r>
-              <a:rPr lang="de-DE" dirty="0" smtClean="0"/>
+              <a:rPr lang="de-DE" dirty="0"/>
               <a:t> Management Tools</a:t>
             </a:r>
           </a:p>
           <a:p>
             <a:r>
-              <a:rPr lang="de-DE" dirty="0" smtClean="0"/>
+              <a:rPr lang="de-DE" dirty="0"/>
               <a:t>Anfällig gegenüber „</a:t>
             </a:r>
             <a:r>
-              <a:rPr lang="de-DE" dirty="0" err="1" smtClean="0"/>
+              <a:rPr lang="de-DE" dirty="0" err="1"/>
               <a:t>configuration</a:t>
             </a:r>
             <a:r>
-              <a:rPr lang="de-DE" dirty="0" smtClean="0"/>
+              <a:rPr lang="de-DE" dirty="0"/>
               <a:t> </a:t>
             </a:r>
             <a:r>
-              <a:rPr lang="de-DE" dirty="0" err="1" smtClean="0"/>
+              <a:rPr lang="de-DE" dirty="0" err="1"/>
               <a:t>drift</a:t>
             </a:r>
             <a:r>
-              <a:rPr lang="de-DE" dirty="0" smtClean="0"/>
+              <a:rPr lang="de-DE" dirty="0"/>
               <a:t>“ </a:t>
             </a:r>
-            <a:endParaRPr lang="de-DE" dirty="0"/>
           </a:p>
         </p:txBody>
       </p:sp>
@@ -10540,14 +10159,13 @@
           <a:lstStyle/>
           <a:p>
             <a:r>
-              <a:rPr lang="de-DE" dirty="0" err="1" smtClean="0"/>
+              <a:rPr lang="de-DE" dirty="0" err="1"/>
               <a:t>Immutatble</a:t>
             </a:r>
             <a:r>
-              <a:rPr lang="de-DE" dirty="0" smtClean="0"/>
+              <a:rPr lang="de-DE" dirty="0"/>
               <a:t> Infrastructure</a:t>
             </a:r>
-            <a:endParaRPr lang="de-DE" dirty="0"/>
           </a:p>
         </p:txBody>
       </p:sp>
@@ -10567,46 +10185,45 @@
           <a:lstStyle/>
           <a:p>
             <a:r>
-              <a:rPr lang="de-DE" dirty="0" smtClean="0"/>
+              <a:rPr lang="de-DE" dirty="0"/>
               <a:t>Updates führen zum Austausch der Ressourcen</a:t>
             </a:r>
           </a:p>
           <a:p>
             <a:r>
-              <a:rPr lang="de-DE" dirty="0" smtClean="0"/>
+              <a:rPr lang="de-DE" dirty="0"/>
               <a:t>Für die meisten </a:t>
             </a:r>
             <a:r>
-              <a:rPr lang="de-DE" dirty="0" err="1" smtClean="0"/>
+              <a:rPr lang="de-DE" dirty="0" err="1"/>
               <a:t>Changes</a:t>
             </a:r>
             <a:r>
-              <a:rPr lang="de-DE" dirty="0" smtClean="0"/>
+              <a:rPr lang="de-DE" dirty="0"/>
               <a:t> der Standard bei </a:t>
             </a:r>
             <a:r>
-              <a:rPr lang="de-DE" dirty="0" err="1" smtClean="0"/>
+              <a:rPr lang="de-DE" dirty="0" err="1"/>
               <a:t>Provisioning</a:t>
             </a:r>
             <a:r>
-              <a:rPr lang="de-DE" dirty="0" smtClean="0"/>
+              <a:rPr lang="de-DE" dirty="0"/>
               <a:t> Tools</a:t>
             </a:r>
           </a:p>
           <a:p>
             <a:r>
-              <a:rPr lang="de-DE" dirty="0" smtClean="0"/>
+              <a:rPr lang="de-DE" dirty="0"/>
               <a:t>Kann ggf. zu </a:t>
             </a:r>
             <a:r>
-              <a:rPr lang="de-DE" dirty="0" err="1" smtClean="0"/>
+              <a:rPr lang="de-DE" dirty="0" err="1"/>
               <a:t>Downtimes</a:t>
             </a:r>
             <a:r>
-              <a:rPr lang="de-DE" dirty="0" smtClean="0"/>
+              <a:rPr lang="de-DE" dirty="0"/>
               <a:t> führen</a:t>
             </a:r>
-            <a:endParaRPr lang="de-DE" dirty="0"/>
           </a:p>
         </p:txBody>
       </p:sp>
@@ -10656,10 +10273,9 @@
           <a:lstStyle/>
           <a:p>
             <a:r>
-              <a:rPr lang="de-DE" dirty="0" smtClean="0"/>
+              <a:rPr lang="de-DE" dirty="0"/>
               <a:t>Terraform </a:t>
             </a:r>
-            <a:endParaRPr lang="de-DE" dirty="0"/>
           </a:p>
         </p:txBody>
       </p:sp>
@@ -10882,19 +10498,11 @@
               <a:buNone/>
             </a:pPr>
             <a:r>
-              <a:rPr lang="en-US" dirty="0" smtClean="0"/>
-              <a:t>„Terraform </a:t>
-            </a:r>
-            <a:r>
               <a:rPr lang="en-US" dirty="0"/>
-              <a:t>is an open-source infrastructure as code software tool that provides a consistent CLI workflow to manage hundreds of cloud services. Terraform codifies cloud APIs into declarative configuration files</a:t>
-            </a:r>
-            <a:r>
-              <a:rPr lang="en-US" dirty="0" smtClean="0"/>
-              <a:t>.</a:t>
-            </a:r>
-            <a:r>
-              <a:rPr lang="de-DE" dirty="0" smtClean="0"/>
+              <a:t>„Terraform is an open-source infrastructure as code software tool that provides a consistent CLI workflow to manage hundreds of cloud services. Terraform codifies cloud APIs into declarative configuration files.</a:t>
+            </a:r>
+            <a:r>
+              <a:rPr lang="de-DE" dirty="0"/>
               <a:t>“</a:t>
             </a:r>
           </a:p>
@@ -10904,24 +10512,12 @@
               <a:buChar char="-"/>
             </a:pPr>
             <a:r>
-              <a:rPr lang="de-DE" dirty="0" smtClean="0">
-                <a:hlinkClick r:id="rId4"/>
-              </a:rPr>
-              <a:t>https</a:t>
-            </a:r>
-            <a:r>
               <a:rPr lang="de-DE" dirty="0">
                 <a:hlinkClick r:id="rId4"/>
               </a:rPr>
-              <a:t>://www.terraform.io</a:t>
-            </a:r>
-            <a:r>
-              <a:rPr lang="de-DE" dirty="0" smtClean="0">
-                <a:hlinkClick r:id="rId4"/>
-              </a:rPr>
-              <a:t>/</a:t>
-            </a:r>
-            <a:endParaRPr lang="de-DE" dirty="0" smtClean="0"/>
+              <a:t>https://www.terraform.io/</a:t>
+            </a:r>
+            <a:endParaRPr lang="de-DE" dirty="0"/>
           </a:p>
           <a:p>
             <a:pPr marL="0" indent="0">

</xml_diff>